<commit_message>
Changes from ESPC webinar
</commit_message>
<xml_diff>
--- a/Not sure how you should REACT.pptx
+++ b/Not sure how you should REACT.pptx
@@ -5,30 +5,33 @@
     <p:sldMasterId id="2147483648" r:id="rId1"/>
   </p:sldMasterIdLst>
   <p:notesMasterIdLst>
-    <p:notesMasterId r:id="rId23"/>
+    <p:notesMasterId r:id="rId26"/>
   </p:notesMasterIdLst>
   <p:sldIdLst>
     <p:sldId id="256" r:id="rId2"/>
     <p:sldId id="274" r:id="rId3"/>
     <p:sldId id="258" r:id="rId4"/>
-    <p:sldId id="275" r:id="rId5"/>
-    <p:sldId id="276" r:id="rId6"/>
-    <p:sldId id="281" r:id="rId7"/>
-    <p:sldId id="282" r:id="rId8"/>
-    <p:sldId id="284" r:id="rId9"/>
-    <p:sldId id="285" r:id="rId10"/>
-    <p:sldId id="283" r:id="rId11"/>
-    <p:sldId id="286" r:id="rId12"/>
-    <p:sldId id="287" r:id="rId13"/>
-    <p:sldId id="288" r:id="rId14"/>
-    <p:sldId id="280" r:id="rId15"/>
-    <p:sldId id="289" r:id="rId16"/>
-    <p:sldId id="277" r:id="rId17"/>
-    <p:sldId id="278" r:id="rId18"/>
-    <p:sldId id="266" r:id="rId19"/>
-    <p:sldId id="259" r:id="rId20"/>
-    <p:sldId id="260" r:id="rId21"/>
-    <p:sldId id="279" r:id="rId22"/>
+    <p:sldId id="291" r:id="rId5"/>
+    <p:sldId id="292" r:id="rId6"/>
+    <p:sldId id="275" r:id="rId7"/>
+    <p:sldId id="276" r:id="rId8"/>
+    <p:sldId id="281" r:id="rId9"/>
+    <p:sldId id="282" r:id="rId10"/>
+    <p:sldId id="293" r:id="rId11"/>
+    <p:sldId id="284" r:id="rId12"/>
+    <p:sldId id="285" r:id="rId13"/>
+    <p:sldId id="283" r:id="rId14"/>
+    <p:sldId id="286" r:id="rId15"/>
+    <p:sldId id="287" r:id="rId16"/>
+    <p:sldId id="288" r:id="rId17"/>
+    <p:sldId id="280" r:id="rId18"/>
+    <p:sldId id="289" r:id="rId19"/>
+    <p:sldId id="290" r:id="rId20"/>
+    <p:sldId id="277" r:id="rId21"/>
+    <p:sldId id="278" r:id="rId22"/>
+    <p:sldId id="266" r:id="rId23"/>
+    <p:sldId id="260" r:id="rId24"/>
+    <p:sldId id="259" r:id="rId25"/>
   </p:sldIdLst>
   <p:sldSz cx="12192000" cy="6858000"/>
   <p:notesSz cx="6858000" cy="9144000"/>
@@ -221,7 +224,7 @@
           <a:p>
             <a:fld id="{F0FB884C-D94F-4A8C-A7CE-5E6392C25757}" type="datetimeFigureOut">
               <a:rPr lang="en-US" smtClean="0"/>
-              <a:t>4/19/2017</a:t>
+              <a:t>7/18/2017</a:t>
             </a:fld>
             <a:endParaRPr lang="en-US"/>
           </a:p>
@@ -636,7 +639,7 @@
           <a:p>
             <a:fld id="{B0B3309E-6308-4C85-A033-C811C5615FCD}" type="slidenum">
               <a:rPr lang="en-US" smtClean="0"/>
-              <a:t>19</a:t>
+              <a:t>24</a:t>
             </a:fld>
             <a:endParaRPr lang="en-US"/>
           </a:p>
@@ -794,7 +797,7 @@
           <a:p>
             <a:fld id="{48A87A34-81AB-432B-8DAE-1953F412C126}" type="datetimeFigureOut">
               <a:rPr lang="en-US" dirty="0"/>
-              <a:t>4/19/2017</a:t>
+              <a:t>7/18/2017</a:t>
             </a:fld>
             <a:endParaRPr lang="en-US" dirty="0"/>
           </a:p>
@@ -1000,7 +1003,7 @@
           <a:p>
             <a:fld id="{48A87A34-81AB-432B-8DAE-1953F412C126}" type="datetimeFigureOut">
               <a:rPr lang="en-US" dirty="0"/>
-              <a:t>4/19/2017</a:t>
+              <a:t>7/18/2017</a:t>
             </a:fld>
             <a:endParaRPr lang="en-US" dirty="0"/>
           </a:p>
@@ -1210,7 +1213,7 @@
           <a:p>
             <a:fld id="{48A87A34-81AB-432B-8DAE-1953F412C126}" type="datetimeFigureOut">
               <a:rPr lang="en-US" dirty="0"/>
-              <a:t>4/19/2017</a:t>
+              <a:t>7/18/2017</a:t>
             </a:fld>
             <a:endParaRPr lang="en-US" dirty="0"/>
           </a:p>
@@ -1428,7 +1431,7 @@
           <a:p>
             <a:fld id="{48A87A34-81AB-432B-8DAE-1953F412C126}" type="datetimeFigureOut">
               <a:rPr lang="en-US" dirty="0"/>
-              <a:t>4/19/2017</a:t>
+              <a:t>7/18/2017</a:t>
             </a:fld>
             <a:endParaRPr lang="en-US" dirty="0"/>
           </a:p>
@@ -1598,7 +1601,7 @@
           <a:p>
             <a:fld id="{48A87A34-81AB-432B-8DAE-1953F412C126}" type="datetimeFigureOut">
               <a:rPr lang="en-US" dirty="0"/>
-              <a:t>4/19/2017</a:t>
+              <a:t>7/18/2017</a:t>
             </a:fld>
             <a:endParaRPr lang="en-US" dirty="0"/>
           </a:p>
@@ -1872,7 +1875,7 @@
           <a:p>
             <a:fld id="{48A87A34-81AB-432B-8DAE-1953F412C126}" type="datetimeFigureOut">
               <a:rPr lang="en-US" dirty="0"/>
-              <a:t>4/19/2017</a:t>
+              <a:t>7/18/2017</a:t>
             </a:fld>
             <a:endParaRPr lang="en-US" dirty="0"/>
           </a:p>
@@ -2135,7 +2138,7 @@
           <a:p>
             <a:fld id="{48A87A34-81AB-432B-8DAE-1953F412C126}" type="datetimeFigureOut">
               <a:rPr lang="en-US" dirty="0"/>
-              <a:t>4/19/2017</a:t>
+              <a:t>7/18/2017</a:t>
             </a:fld>
             <a:endParaRPr lang="en-US" dirty="0"/>
           </a:p>
@@ -2546,7 +2549,7 @@
           <a:p>
             <a:fld id="{48A87A34-81AB-432B-8DAE-1953F412C126}" type="datetimeFigureOut">
               <a:rPr lang="en-US" dirty="0"/>
-              <a:t>4/19/2017</a:t>
+              <a:t>7/18/2017</a:t>
             </a:fld>
             <a:endParaRPr lang="en-US" dirty="0"/>
           </a:p>
@@ -2690,7 +2693,7 @@
           <a:p>
             <a:fld id="{48A87A34-81AB-432B-8DAE-1953F412C126}" type="datetimeFigureOut">
               <a:rPr lang="en-US" dirty="0"/>
-              <a:t>4/19/2017</a:t>
+              <a:t>7/18/2017</a:t>
             </a:fld>
             <a:endParaRPr lang="en-US" dirty="0"/>
           </a:p>
@@ -2811,7 +2814,7 @@
           <a:p>
             <a:fld id="{48A87A34-81AB-432B-8DAE-1953F412C126}" type="datetimeFigureOut">
               <a:rPr lang="en-US" dirty="0"/>
-              <a:t>4/19/2017</a:t>
+              <a:t>7/18/2017</a:t>
             </a:fld>
             <a:endParaRPr lang="en-US" dirty="0"/>
           </a:p>
@@ -3057,7 +3060,7 @@
           <a:p>
             <a:fld id="{48A87A34-81AB-432B-8DAE-1953F412C126}" type="datetimeFigureOut">
               <a:rPr lang="en-US" dirty="0"/>
-              <a:t>4/19/2017</a:t>
+              <a:t>7/18/2017</a:t>
             </a:fld>
             <a:endParaRPr lang="en-US" dirty="0"/>
           </a:p>
@@ -3498,7 +3501,7 @@
             <a:fld id="{48A87A34-81AB-432B-8DAE-1953F412C126}" type="datetimeFigureOut">
               <a:rPr lang="en-US" dirty="0"/>
               <a:pPr/>
-              <a:t>4/19/2017</a:t>
+              <a:t>7/18/2017</a:t>
             </a:fld>
             <a:endParaRPr lang="en-US" dirty="0"/>
           </a:p>
@@ -3820,7 +3823,7 @@
             <a:fld id="{48A87A34-81AB-432B-8DAE-1953F412C126}" type="datetimeFigureOut">
               <a:rPr lang="en-US" dirty="0"/>
               <a:pPr/>
-              <a:t>4/19/2017</a:t>
+              <a:t>7/18/2017</a:t>
             </a:fld>
             <a:endParaRPr lang="en-US" dirty="0"/>
           </a:p>
@@ -4322,7 +4325,7 @@
           <a:p>
             <a:r>
               <a:rPr lang="en-US" sz="5400" b="1" dirty="0"/>
-              <a:t>Not Sure how you Should React</a:t>
+              <a:t>Not Sure how To React</a:t>
             </a:r>
             <a:endParaRPr lang="en-US" sz="5400" dirty="0"/>
           </a:p>
@@ -4344,12 +4347,22 @@
           <a:lstStyle/>
           <a:p>
             <a:r>
+              <a:rPr lang="en-US" dirty="0"/>
+              <a:t>European </a:t>
+            </a:r>
+            <a:r>
               <a:rPr lang="en-US" dirty="0" err="1"/>
-              <a:t>SharePpoint</a:t>
-            </a:r>
-            <a:r>
-              <a:rPr lang="en-US" dirty="0"/>
-              <a:t> Fest DC 2017</a:t>
+              <a:t>SharEPoint</a:t>
+            </a:r>
+            <a:r>
+              <a:rPr lang="en-US" dirty="0"/>
+              <a:t>/Office 365/Azure Community Webinar</a:t>
+            </a:r>
+          </a:p>
+          <a:p>
+            <a:r>
+              <a:rPr lang="en-US" dirty="0"/>
+              <a:t>July 18, 2017</a:t>
             </a:r>
           </a:p>
         </p:txBody>
@@ -4410,77 +4423,29 @@
       </p:grpSpPr>
       <p:sp>
         <p:nvSpPr>
-          <p:cNvPr id="2" name="Title 1"/>
-          <p:cNvSpPr>
-            <a:spLocks noGrp="1"/>
-          </p:cNvSpPr>
-          <p:nvPr>
-            <p:ph type="title"/>
-          </p:nvPr>
-        </p:nvSpPr>
-        <p:spPr/>
-        <p:txBody>
-          <a:bodyPr/>
+          <p:cNvPr id="2" name="TextBox 1"/>
+          <p:cNvSpPr txBox="1"/>
+          <p:nvPr/>
+        </p:nvSpPr>
+        <p:spPr>
+          <a:xfrm>
+            <a:off x="2308123" y="2042652"/>
+            <a:ext cx="6157451" cy="1569660"/>
+          </a:xfrm>
+          <a:prstGeom prst="rect">
+            <a:avLst/>
+          </a:prstGeom>
+          <a:noFill/>
+        </p:spPr>
+        <p:txBody>
+          <a:bodyPr wrap="square" rtlCol="0">
+            <a:spAutoFit/>
+          </a:bodyPr>
           <a:lstStyle/>
           <a:p>
             <a:r>
-              <a:rPr lang="en-US" dirty="0"/>
-              <a:t>DOM Events</a:t>
-            </a:r>
-          </a:p>
-        </p:txBody>
-      </p:sp>
-      <p:sp>
-        <p:nvSpPr>
-          <p:cNvPr id="3" name="Content Placeholder 2"/>
-          <p:cNvSpPr>
-            <a:spLocks noGrp="1"/>
-          </p:cNvSpPr>
-          <p:nvPr>
-            <p:ph idx="1"/>
-          </p:nvPr>
-        </p:nvSpPr>
-        <p:spPr/>
-        <p:txBody>
-          <a:bodyPr/>
-          <a:lstStyle/>
-          <a:p>
-            <a:r>
-              <a:rPr lang="en-US" dirty="0"/>
-              <a:t>Events we add to our markup are not the standard HTML events</a:t>
-            </a:r>
-          </a:p>
-          <a:p>
-            <a:r>
-              <a:rPr lang="en-US" dirty="0"/>
-              <a:t>Events are </a:t>
-            </a:r>
-            <a:r>
-              <a:rPr lang="en-US" dirty="0" err="1"/>
-              <a:t>camelCased</a:t>
-            </a:r>
-            <a:r>
-              <a:rPr lang="en-US" dirty="0"/>
-              <a:t> not lowercased like HTML </a:t>
-            </a:r>
-            <a:r>
-              <a:rPr lang="en-US" dirty="0" err="1"/>
-              <a:t>onclick</a:t>
-            </a:r>
-            <a:r>
-              <a:rPr lang="en-US" dirty="0"/>
-              <a:t> vs </a:t>
-            </a:r>
-            <a:r>
-              <a:rPr lang="en-US" dirty="0" err="1"/>
-              <a:t>onClick</a:t>
-            </a:r>
-            <a:endParaRPr lang="en-US" dirty="0"/>
-          </a:p>
-          <a:p>
-            <a:r>
-              <a:rPr lang="en-US" dirty="0"/>
-              <a:t>You pass in the function to the event handler not a string</a:t>
+              <a:rPr lang="en-US" sz="9600" dirty="0"/>
+              <a:t>Demo</a:t>
             </a:r>
           </a:p>
         </p:txBody>
@@ -4488,7 +4453,7 @@
     </p:spTree>
     <p:extLst>
       <p:ext uri="{BB962C8B-B14F-4D97-AF65-F5344CB8AC3E}">
-        <p14:creationId xmlns:p14="http://schemas.microsoft.com/office/powerpoint/2010/main" val="3790137817"/>
+        <p14:creationId xmlns:p14="http://schemas.microsoft.com/office/powerpoint/2010/main" val="3698000210"/>
       </p:ext>
     </p:extLst>
   </p:cSld>
@@ -4532,7 +4497,7 @@
           <a:p>
             <a:r>
               <a:rPr lang="en-US" dirty="0"/>
-              <a:t>Conditional Rendering</a:t>
+              <a:t>Props and State</a:t>
             </a:r>
           </a:p>
         </p:txBody>
@@ -4554,56 +4519,60 @@
           <a:p>
             <a:r>
               <a:rPr lang="en-US" dirty="0"/>
-              <a:t>Several methods</a:t>
+              <a:t>Props</a:t>
             </a:r>
           </a:p>
           <a:p>
             <a:pPr lvl="1"/>
             <a:r>
               <a:rPr lang="en-US" dirty="0"/>
-              <a:t>Store element as variable</a:t>
-            </a:r>
-          </a:p>
-          <a:p>
-            <a:pPr lvl="2"/>
-            <a:r>
-              <a:rPr lang="en-US" dirty="0"/>
-              <a:t>Null elements will not be loaded</a:t>
+              <a:t>Using props to pass data to your components</a:t>
             </a:r>
           </a:p>
           <a:p>
             <a:pPr lvl="1"/>
             <a:r>
               <a:rPr lang="en-US" dirty="0"/>
-              <a:t>Inline if</a:t>
-            </a:r>
-          </a:p>
-          <a:p>
-            <a:pPr lvl="2"/>
-            <a:r>
-              <a:rPr lang="en-US" dirty="0"/>
-              <a:t>Must use following syntax</a:t>
-            </a:r>
-          </a:p>
-          <a:p>
-            <a:pPr lvl="3"/>
-            <a:r>
-              <a:rPr lang="en-US" dirty="0"/>
-              <a:t>Condition &amp;&amp; &lt;element&gt;</a:t>
+              <a:t>Props are read-only</a:t>
+            </a:r>
+          </a:p>
+          <a:p>
+            <a:r>
+              <a:rPr lang="en-US" dirty="0"/>
+              <a:t>State</a:t>
             </a:r>
           </a:p>
           <a:p>
             <a:pPr lvl="1"/>
             <a:r>
               <a:rPr lang="en-US" dirty="0"/>
-              <a:t>Tertiary operator</a:t>
-            </a:r>
-          </a:p>
-          <a:p>
-            <a:pPr lvl="2"/>
-            <a:r>
-              <a:rPr lang="en-US" dirty="0"/>
-              <a:t>(condition)?&lt;element1 /&gt;:&lt;element2 /&gt;</a:t>
+              <a:t>State allows us to receive/work with changeable data</a:t>
+            </a:r>
+          </a:p>
+          <a:p>
+            <a:pPr lvl="1"/>
+            <a:r>
+              <a:rPr lang="en-US" dirty="0"/>
+              <a:t>Set initial state in constructor</a:t>
+            </a:r>
+          </a:p>
+          <a:p>
+            <a:pPr lvl="1"/>
+            <a:r>
+              <a:rPr lang="en-US" dirty="0"/>
+              <a:t>Do not update directly use </a:t>
+            </a:r>
+            <a:r>
+              <a:rPr lang="en-US" dirty="0" err="1"/>
+              <a:t>setState</a:t>
+            </a:r>
+            <a:endParaRPr lang="en-US" dirty="0"/>
+          </a:p>
+          <a:p>
+            <a:pPr lvl="1"/>
+            <a:r>
+              <a:rPr lang="en-US" dirty="0"/>
+              <a:t>Updates are merged</a:t>
             </a:r>
           </a:p>
         </p:txBody>
@@ -4611,7 +4580,7 @@
     </p:spTree>
     <p:extLst>
       <p:ext uri="{BB962C8B-B14F-4D97-AF65-F5344CB8AC3E}">
-        <p14:creationId xmlns:p14="http://schemas.microsoft.com/office/powerpoint/2010/main" val="3685186151"/>
+        <p14:creationId xmlns:p14="http://schemas.microsoft.com/office/powerpoint/2010/main" val="4232452455"/>
       </p:ext>
     </p:extLst>
   </p:cSld>
@@ -4655,7 +4624,7 @@
           <a:p>
             <a:r>
               <a:rPr lang="en-US" dirty="0"/>
-              <a:t>Lists of Items</a:t>
+              <a:t>Lifecycle</a:t>
             </a:r>
           </a:p>
         </p:txBody>
@@ -4677,45 +4646,58 @@
           <a:p>
             <a:r>
               <a:rPr lang="en-US" dirty="0"/>
-              <a:t>Use the JavaScript map command</a:t>
+              <a:t>constructor()</a:t>
             </a:r>
           </a:p>
           <a:p>
             <a:pPr lvl="1"/>
             <a:r>
+              <a:rPr lang="en-US" dirty="0"/>
+              <a:t>Used to set initial state</a:t>
+            </a:r>
+          </a:p>
+          <a:p>
+            <a:pPr lvl="1"/>
+            <a:r>
+              <a:rPr lang="en-US" dirty="0"/>
+              <a:t>Best Practice don’t load external data here</a:t>
+            </a:r>
+          </a:p>
+          <a:p>
+            <a:r>
               <a:rPr lang="en-US" dirty="0" err="1"/>
-              <a:t>Object.map</a:t>
-            </a:r>
-            <a:r>
-              <a:rPr lang="en-US" dirty="0"/>
-              <a:t>((item) =&gt; { return &lt;element /&gt; })</a:t>
-            </a:r>
-          </a:p>
-          <a:p>
-            <a:r>
-              <a:rPr lang="en-US" dirty="0"/>
-              <a:t>Make sure you add a key attribute to help React with rendering and handling changes</a:t>
+              <a:t>componentDidMount</a:t>
+            </a:r>
+            <a:r>
+              <a:rPr lang="en-US" dirty="0"/>
+              <a:t>()</a:t>
             </a:r>
           </a:p>
           <a:p>
             <a:pPr lvl="1"/>
             <a:r>
+              <a:rPr lang="en-US" dirty="0"/>
+              <a:t>Used to setup component and load external data</a:t>
+            </a:r>
+          </a:p>
+          <a:p>
+            <a:r>
               <a:rPr lang="en-US" dirty="0" err="1"/>
-              <a:t>Object.map</a:t>
-            </a:r>
-            <a:r>
-              <a:rPr lang="en-US" dirty="0"/>
-              <a:t>((item) =&gt; { return &lt;element key={item.ID} /&gt; })</a:t>
-            </a:r>
-          </a:p>
-          <a:p>
-            <a:r>
-              <a:rPr lang="en-US" dirty="0"/>
-              <a:t>Keys must be unique among siblings</a:t>
+              <a:t>compononentWillUnmount</a:t>
+            </a:r>
+            <a:r>
+              <a:rPr lang="en-US" dirty="0"/>
+              <a:t>()</a:t>
             </a:r>
           </a:p>
           <a:p>
             <a:pPr lvl="1"/>
+            <a:r>
+              <a:rPr lang="en-US" dirty="0"/>
+              <a:t>Used for clean up</a:t>
+            </a:r>
+          </a:p>
+          <a:p>
             <a:endParaRPr lang="en-US" dirty="0"/>
           </a:p>
         </p:txBody>
@@ -4723,7 +4705,7 @@
     </p:spTree>
     <p:extLst>
       <p:ext uri="{BB962C8B-B14F-4D97-AF65-F5344CB8AC3E}">
-        <p14:creationId xmlns:p14="http://schemas.microsoft.com/office/powerpoint/2010/main" val="3649862819"/>
+        <p14:creationId xmlns:p14="http://schemas.microsoft.com/office/powerpoint/2010/main" val="1626070486"/>
       </p:ext>
     </p:extLst>
   </p:cSld>
@@ -4767,7 +4749,7 @@
           <a:p>
             <a:r>
               <a:rPr lang="en-US" dirty="0"/>
-              <a:t>Forms and Output</a:t>
+              <a:t>DOM Events</a:t>
             </a:r>
           </a:p>
         </p:txBody>
@@ -4789,21 +4771,40 @@
           <a:p>
             <a:r>
               <a:rPr lang="en-US" dirty="0"/>
-              <a:t>Use </a:t>
+              <a:t>Events we add to our markup are not the standard HTML events</a:t>
+            </a:r>
+          </a:p>
+          <a:p>
+            <a:r>
+              <a:rPr lang="en-US" dirty="0"/>
+              <a:t>Events are </a:t>
             </a:r>
             <a:r>
               <a:rPr lang="en-US" dirty="0" err="1"/>
-              <a:t>onChange</a:t>
-            </a:r>
-            <a:r>
-              <a:rPr lang="en-US" dirty="0"/>
-              <a:t> event to get the changed values</a:t>
-            </a:r>
-          </a:p>
-          <a:p>
-            <a:r>
-              <a:rPr lang="en-US" dirty="0"/>
-              <a:t>Output content using {}</a:t>
+              <a:t>camelCased</a:t>
+            </a:r>
+            <a:r>
+              <a:rPr lang="en-US" dirty="0"/>
+              <a:t> not lowercased like HTML </a:t>
+            </a:r>
+            <a:r>
+              <a:rPr lang="en-US" dirty="0" err="1"/>
+              <a:t>onclick</a:t>
+            </a:r>
+            <a:r>
+              <a:rPr lang="en-US" dirty="0"/>
+              <a:t> vs </a:t>
+            </a:r>
+            <a:r>
+              <a:rPr lang="en-US" dirty="0" err="1"/>
+              <a:t>onClick</a:t>
+            </a:r>
+            <a:endParaRPr lang="en-US" dirty="0"/>
+          </a:p>
+          <a:p>
+            <a:r>
+              <a:rPr lang="en-US" dirty="0"/>
+              <a:t>You pass in the function to the event handler not a string</a:t>
             </a:r>
           </a:p>
         </p:txBody>
@@ -4811,7 +4812,7 @@
     </p:spTree>
     <p:extLst>
       <p:ext uri="{BB962C8B-B14F-4D97-AF65-F5344CB8AC3E}">
-        <p14:creationId xmlns:p14="http://schemas.microsoft.com/office/powerpoint/2010/main" val="1480904957"/>
+        <p14:creationId xmlns:p14="http://schemas.microsoft.com/office/powerpoint/2010/main" val="3790137817"/>
       </p:ext>
     </p:extLst>
   </p:cSld>
@@ -4855,6 +4856,329 @@
           <a:p>
             <a:r>
               <a:rPr lang="en-US" dirty="0"/>
+              <a:t>Conditional Rendering</a:t>
+            </a:r>
+          </a:p>
+        </p:txBody>
+      </p:sp>
+      <p:sp>
+        <p:nvSpPr>
+          <p:cNvPr id="3" name="Content Placeholder 2"/>
+          <p:cNvSpPr>
+            <a:spLocks noGrp="1"/>
+          </p:cNvSpPr>
+          <p:nvPr>
+            <p:ph idx="1"/>
+          </p:nvPr>
+        </p:nvSpPr>
+        <p:spPr/>
+        <p:txBody>
+          <a:bodyPr/>
+          <a:lstStyle/>
+          <a:p>
+            <a:r>
+              <a:rPr lang="en-US" dirty="0"/>
+              <a:t>Several methods</a:t>
+            </a:r>
+          </a:p>
+          <a:p>
+            <a:pPr lvl="1"/>
+            <a:r>
+              <a:rPr lang="en-US" dirty="0"/>
+              <a:t>Store element as variable</a:t>
+            </a:r>
+          </a:p>
+          <a:p>
+            <a:pPr lvl="2"/>
+            <a:r>
+              <a:rPr lang="en-US" dirty="0"/>
+              <a:t>Null elements will not be loaded</a:t>
+            </a:r>
+          </a:p>
+          <a:p>
+            <a:pPr lvl="1"/>
+            <a:r>
+              <a:rPr lang="en-US" dirty="0"/>
+              <a:t>Inline if</a:t>
+            </a:r>
+          </a:p>
+          <a:p>
+            <a:pPr lvl="2"/>
+            <a:r>
+              <a:rPr lang="en-US" dirty="0"/>
+              <a:t>Must use following syntax</a:t>
+            </a:r>
+          </a:p>
+          <a:p>
+            <a:pPr lvl="3"/>
+            <a:r>
+              <a:rPr lang="en-US" dirty="0"/>
+              <a:t>Condition &amp;&amp; &lt;element&gt;</a:t>
+            </a:r>
+          </a:p>
+          <a:p>
+            <a:pPr lvl="1"/>
+            <a:r>
+              <a:rPr lang="en-US" dirty="0"/>
+              <a:t>Tertiary operator</a:t>
+            </a:r>
+          </a:p>
+          <a:p>
+            <a:pPr lvl="2"/>
+            <a:r>
+              <a:rPr lang="en-US" dirty="0"/>
+              <a:t>(condition)?&lt;element1 /&gt;:&lt;element2 /&gt;</a:t>
+            </a:r>
+          </a:p>
+        </p:txBody>
+      </p:sp>
+    </p:spTree>
+    <p:extLst>
+      <p:ext uri="{BB962C8B-B14F-4D97-AF65-F5344CB8AC3E}">
+        <p14:creationId xmlns:p14="http://schemas.microsoft.com/office/powerpoint/2010/main" val="3685186151"/>
+      </p:ext>
+    </p:extLst>
+  </p:cSld>
+  <p:clrMapOvr>
+    <a:masterClrMapping/>
+  </p:clrMapOvr>
+</p:sld>
+</file>
+
+<file path=ppt/slides/slide15.xml><?xml version="1.0" encoding="utf-8"?>
+<p:sld xmlns:a="http://schemas.openxmlformats.org/drawingml/2006/main" xmlns:r="http://schemas.openxmlformats.org/officeDocument/2006/relationships" xmlns:p="http://schemas.openxmlformats.org/presentationml/2006/main">
+  <p:cSld>
+    <p:spTree>
+      <p:nvGrpSpPr>
+        <p:cNvPr id="1" name=""/>
+        <p:cNvGrpSpPr/>
+        <p:nvPr/>
+      </p:nvGrpSpPr>
+      <p:grpSpPr>
+        <a:xfrm>
+          <a:off x="0" y="0"/>
+          <a:ext cx="0" cy="0"/>
+          <a:chOff x="0" y="0"/>
+          <a:chExt cx="0" cy="0"/>
+        </a:xfrm>
+      </p:grpSpPr>
+      <p:sp>
+        <p:nvSpPr>
+          <p:cNvPr id="2" name="Title 1"/>
+          <p:cNvSpPr>
+            <a:spLocks noGrp="1"/>
+          </p:cNvSpPr>
+          <p:nvPr>
+            <p:ph type="title"/>
+          </p:nvPr>
+        </p:nvSpPr>
+        <p:spPr/>
+        <p:txBody>
+          <a:bodyPr/>
+          <a:lstStyle/>
+          <a:p>
+            <a:r>
+              <a:rPr lang="en-US" dirty="0"/>
+              <a:t>Lists of Items</a:t>
+            </a:r>
+          </a:p>
+        </p:txBody>
+      </p:sp>
+      <p:sp>
+        <p:nvSpPr>
+          <p:cNvPr id="3" name="Content Placeholder 2"/>
+          <p:cNvSpPr>
+            <a:spLocks noGrp="1"/>
+          </p:cNvSpPr>
+          <p:nvPr>
+            <p:ph idx="1"/>
+          </p:nvPr>
+        </p:nvSpPr>
+        <p:spPr/>
+        <p:txBody>
+          <a:bodyPr/>
+          <a:lstStyle/>
+          <a:p>
+            <a:r>
+              <a:rPr lang="en-US" dirty="0"/>
+              <a:t>Use the JavaScript map command</a:t>
+            </a:r>
+          </a:p>
+          <a:p>
+            <a:pPr lvl="1"/>
+            <a:r>
+              <a:rPr lang="en-US" dirty="0" err="1"/>
+              <a:t>Object.map</a:t>
+            </a:r>
+            <a:r>
+              <a:rPr lang="en-US" dirty="0"/>
+              <a:t>((item) =&gt; { return &lt;element /&gt; })</a:t>
+            </a:r>
+          </a:p>
+          <a:p>
+            <a:r>
+              <a:rPr lang="en-US" dirty="0"/>
+              <a:t>Make sure you add a key attribute to help React with rendering and handling changes</a:t>
+            </a:r>
+          </a:p>
+          <a:p>
+            <a:pPr lvl="1"/>
+            <a:r>
+              <a:rPr lang="en-US" dirty="0" err="1"/>
+              <a:t>Object.map</a:t>
+            </a:r>
+            <a:r>
+              <a:rPr lang="en-US" dirty="0"/>
+              <a:t>((item) =&gt; { return &lt;element key={item.ID} /&gt; })</a:t>
+            </a:r>
+          </a:p>
+          <a:p>
+            <a:r>
+              <a:rPr lang="en-US" dirty="0"/>
+              <a:t>Keys must be unique among siblings</a:t>
+            </a:r>
+          </a:p>
+          <a:p>
+            <a:pPr lvl="1"/>
+            <a:endParaRPr lang="en-US" dirty="0"/>
+          </a:p>
+        </p:txBody>
+      </p:sp>
+    </p:spTree>
+    <p:extLst>
+      <p:ext uri="{BB962C8B-B14F-4D97-AF65-F5344CB8AC3E}">
+        <p14:creationId xmlns:p14="http://schemas.microsoft.com/office/powerpoint/2010/main" val="3649862819"/>
+      </p:ext>
+    </p:extLst>
+  </p:cSld>
+  <p:clrMapOvr>
+    <a:masterClrMapping/>
+  </p:clrMapOvr>
+</p:sld>
+</file>
+
+<file path=ppt/slides/slide16.xml><?xml version="1.0" encoding="utf-8"?>
+<p:sld xmlns:a="http://schemas.openxmlformats.org/drawingml/2006/main" xmlns:r="http://schemas.openxmlformats.org/officeDocument/2006/relationships" xmlns:p="http://schemas.openxmlformats.org/presentationml/2006/main">
+  <p:cSld>
+    <p:spTree>
+      <p:nvGrpSpPr>
+        <p:cNvPr id="1" name=""/>
+        <p:cNvGrpSpPr/>
+        <p:nvPr/>
+      </p:nvGrpSpPr>
+      <p:grpSpPr>
+        <a:xfrm>
+          <a:off x="0" y="0"/>
+          <a:ext cx="0" cy="0"/>
+          <a:chOff x="0" y="0"/>
+          <a:chExt cx="0" cy="0"/>
+        </a:xfrm>
+      </p:grpSpPr>
+      <p:sp>
+        <p:nvSpPr>
+          <p:cNvPr id="2" name="Title 1"/>
+          <p:cNvSpPr>
+            <a:spLocks noGrp="1"/>
+          </p:cNvSpPr>
+          <p:nvPr>
+            <p:ph type="title"/>
+          </p:nvPr>
+        </p:nvSpPr>
+        <p:spPr/>
+        <p:txBody>
+          <a:bodyPr/>
+          <a:lstStyle/>
+          <a:p>
+            <a:r>
+              <a:rPr lang="en-US" dirty="0"/>
+              <a:t>Forms and Output</a:t>
+            </a:r>
+          </a:p>
+        </p:txBody>
+      </p:sp>
+      <p:sp>
+        <p:nvSpPr>
+          <p:cNvPr id="3" name="Content Placeholder 2"/>
+          <p:cNvSpPr>
+            <a:spLocks noGrp="1"/>
+          </p:cNvSpPr>
+          <p:nvPr>
+            <p:ph idx="1"/>
+          </p:nvPr>
+        </p:nvSpPr>
+        <p:spPr/>
+        <p:txBody>
+          <a:bodyPr/>
+          <a:lstStyle/>
+          <a:p>
+            <a:r>
+              <a:rPr lang="en-US" dirty="0"/>
+              <a:t>Use </a:t>
+            </a:r>
+            <a:r>
+              <a:rPr lang="en-US" dirty="0" err="1"/>
+              <a:t>onChange</a:t>
+            </a:r>
+            <a:r>
+              <a:rPr lang="en-US" dirty="0"/>
+              <a:t> event to get the changed values</a:t>
+            </a:r>
+          </a:p>
+          <a:p>
+            <a:r>
+              <a:rPr lang="en-US" dirty="0"/>
+              <a:t>Output content using {}</a:t>
+            </a:r>
+          </a:p>
+        </p:txBody>
+      </p:sp>
+    </p:spTree>
+    <p:extLst>
+      <p:ext uri="{BB962C8B-B14F-4D97-AF65-F5344CB8AC3E}">
+        <p14:creationId xmlns:p14="http://schemas.microsoft.com/office/powerpoint/2010/main" val="1480904957"/>
+      </p:ext>
+    </p:extLst>
+  </p:cSld>
+  <p:clrMapOvr>
+    <a:masterClrMapping/>
+  </p:clrMapOvr>
+</p:sld>
+</file>
+
+<file path=ppt/slides/slide17.xml><?xml version="1.0" encoding="utf-8"?>
+<p:sld xmlns:a="http://schemas.openxmlformats.org/drawingml/2006/main" xmlns:r="http://schemas.openxmlformats.org/officeDocument/2006/relationships" xmlns:p="http://schemas.openxmlformats.org/presentationml/2006/main">
+  <p:cSld>
+    <p:spTree>
+      <p:nvGrpSpPr>
+        <p:cNvPr id="1" name=""/>
+        <p:cNvGrpSpPr/>
+        <p:nvPr/>
+      </p:nvGrpSpPr>
+      <p:grpSpPr>
+        <a:xfrm>
+          <a:off x="0" y="0"/>
+          <a:ext cx="0" cy="0"/>
+          <a:chOff x="0" y="0"/>
+          <a:chExt cx="0" cy="0"/>
+        </a:xfrm>
+      </p:grpSpPr>
+      <p:sp>
+        <p:nvSpPr>
+          <p:cNvPr id="2" name="Title 1"/>
+          <p:cNvSpPr>
+            <a:spLocks noGrp="1"/>
+          </p:cNvSpPr>
+          <p:nvPr>
+            <p:ph type="title"/>
+          </p:nvPr>
+        </p:nvSpPr>
+        <p:spPr/>
+        <p:txBody>
+          <a:bodyPr/>
+          <a:lstStyle/>
+          <a:p>
+            <a:r>
+              <a:rPr lang="en-US" dirty="0"/>
               <a:t>React and SharePoint</a:t>
             </a:r>
           </a:p>
@@ -4910,7 +5234,7 @@
 </p:sld>
 </file>
 
-<file path=ppt/slides/slide15.xml><?xml version="1.0" encoding="utf-8"?>
+<file path=ppt/slides/slide18.xml><?xml version="1.0" encoding="utf-8"?>
 <p:sld xmlns:a="http://schemas.openxmlformats.org/drawingml/2006/main" xmlns:r="http://schemas.openxmlformats.org/officeDocument/2006/relationships" xmlns:p="http://schemas.openxmlformats.org/presentationml/2006/main">
   <p:cSld>
     <p:spTree>
@@ -5879,7 +6203,370 @@
 </p:sld>
 </file>
 
-<file path=ppt/slides/slide16.xml><?xml version="1.0" encoding="utf-8"?>
+<file path=ppt/slides/slide19.xml><?xml version="1.0" encoding="utf-8"?>
+<p:sld xmlns:a="http://schemas.openxmlformats.org/drawingml/2006/main" xmlns:r="http://schemas.openxmlformats.org/officeDocument/2006/relationships" xmlns:p="http://schemas.openxmlformats.org/presentationml/2006/main">
+  <p:cSld>
+    <p:spTree>
+      <p:nvGrpSpPr>
+        <p:cNvPr id="1" name=""/>
+        <p:cNvGrpSpPr/>
+        <p:nvPr/>
+      </p:nvGrpSpPr>
+      <p:grpSpPr>
+        <a:xfrm>
+          <a:off x="0" y="0"/>
+          <a:ext cx="0" cy="0"/>
+          <a:chOff x="0" y="0"/>
+          <a:chExt cx="0" cy="0"/>
+        </a:xfrm>
+      </p:grpSpPr>
+      <p:sp>
+        <p:nvSpPr>
+          <p:cNvPr id="2" name="TextBox 1"/>
+          <p:cNvSpPr txBox="1"/>
+          <p:nvPr/>
+        </p:nvSpPr>
+        <p:spPr>
+          <a:xfrm>
+            <a:off x="2308123" y="2042652"/>
+            <a:ext cx="6157451" cy="1569660"/>
+          </a:xfrm>
+          <a:prstGeom prst="rect">
+            <a:avLst/>
+          </a:prstGeom>
+          <a:noFill/>
+        </p:spPr>
+        <p:txBody>
+          <a:bodyPr wrap="square" rtlCol="0">
+            <a:spAutoFit/>
+          </a:bodyPr>
+          <a:lstStyle/>
+          <a:p>
+            <a:r>
+              <a:rPr lang="en-US" sz="9600" dirty="0"/>
+              <a:t>Demo</a:t>
+            </a:r>
+          </a:p>
+        </p:txBody>
+      </p:sp>
+    </p:spTree>
+    <p:extLst>
+      <p:ext uri="{BB962C8B-B14F-4D97-AF65-F5344CB8AC3E}">
+        <p14:creationId xmlns:p14="http://schemas.microsoft.com/office/powerpoint/2010/main" val="1707727493"/>
+      </p:ext>
+    </p:extLst>
+  </p:cSld>
+  <p:clrMapOvr>
+    <a:masterClrMapping/>
+  </p:clrMapOvr>
+</p:sld>
+</file>
+
+<file path=ppt/slides/slide2.xml><?xml version="1.0" encoding="utf-8"?>
+<p:sld xmlns:a="http://schemas.openxmlformats.org/drawingml/2006/main" xmlns:r="http://schemas.openxmlformats.org/officeDocument/2006/relationships" xmlns:p="http://schemas.openxmlformats.org/presentationml/2006/main">
+  <p:cSld>
+    <p:spTree>
+      <p:nvGrpSpPr>
+        <p:cNvPr id="1" name=""/>
+        <p:cNvGrpSpPr/>
+        <p:nvPr/>
+      </p:nvGrpSpPr>
+      <p:grpSpPr>
+        <a:xfrm>
+          <a:off x="0" y="0"/>
+          <a:ext cx="0" cy="0"/>
+          <a:chOff x="0" y="0"/>
+          <a:chExt cx="0" cy="0"/>
+        </a:xfrm>
+      </p:grpSpPr>
+      <p:pic>
+        <p:nvPicPr>
+          <p:cNvPr id="2" name="Picture 1"/>
+          <p:cNvPicPr>
+            <a:picLocks noChangeAspect="1"/>
+          </p:cNvPicPr>
+          <p:nvPr/>
+        </p:nvPicPr>
+        <p:blipFill>
+          <a:blip r:embed="rId2"/>
+          <a:stretch>
+            <a:fillRect/>
+          </a:stretch>
+        </p:blipFill>
+        <p:spPr>
+          <a:xfrm>
+            <a:off x="398207" y="174419"/>
+            <a:ext cx="2617839" cy="2617839"/>
+          </a:xfrm>
+          <a:prstGeom prst="ellipse">
+            <a:avLst/>
+          </a:prstGeom>
+          <a:ln>
+            <a:noFill/>
+          </a:ln>
+          <a:effectLst>
+            <a:softEdge rad="112500"/>
+          </a:effectLst>
+        </p:spPr>
+      </p:pic>
+      <p:sp>
+        <p:nvSpPr>
+          <p:cNvPr id="3" name="TextBox 2"/>
+          <p:cNvSpPr txBox="1"/>
+          <p:nvPr/>
+        </p:nvSpPr>
+        <p:spPr>
+          <a:xfrm>
+            <a:off x="3723968" y="508820"/>
+            <a:ext cx="7175090" cy="4585871"/>
+          </a:xfrm>
+          <a:prstGeom prst="rect">
+            <a:avLst/>
+          </a:prstGeom>
+          <a:noFill/>
+        </p:spPr>
+        <p:txBody>
+          <a:bodyPr wrap="square" rtlCol="0">
+            <a:spAutoFit/>
+          </a:bodyPr>
+          <a:lstStyle/>
+          <a:p>
+            <a:r>
+              <a:rPr lang="en-US" sz="4000" dirty="0"/>
+              <a:t>Ryan Schouten</a:t>
+            </a:r>
+          </a:p>
+          <a:p>
+            <a:endParaRPr lang="en-US" dirty="0"/>
+          </a:p>
+          <a:p>
+            <a:r>
+              <a:rPr lang="en-US" dirty="0"/>
+              <a:t>Utah SharePoint User Group President</a:t>
+            </a:r>
+          </a:p>
+          <a:p>
+            <a:endParaRPr lang="en-US" dirty="0"/>
+          </a:p>
+          <a:p>
+            <a:r>
+              <a:rPr lang="en-US" dirty="0"/>
+              <a:t>Worked with SharePoint for over10 years</a:t>
+            </a:r>
+          </a:p>
+          <a:p>
+            <a:r>
+              <a:rPr lang="en-US" dirty="0"/>
+              <a:t>I have experience with SharePoint 2003 – 2016</a:t>
+            </a:r>
+          </a:p>
+          <a:p>
+            <a:r>
+              <a:rPr lang="en-US" dirty="0"/>
+              <a:t>I have worked with </a:t>
+            </a:r>
+            <a:r>
+              <a:rPr lang="en-US" dirty="0" err="1"/>
+              <a:t>ASP.Net</a:t>
+            </a:r>
+            <a:r>
+              <a:rPr lang="en-US" dirty="0"/>
+              <a:t> for 15 years</a:t>
+            </a:r>
+          </a:p>
+          <a:p>
+            <a:endParaRPr lang="en-US" dirty="0"/>
+          </a:p>
+          <a:p>
+            <a:endParaRPr lang="en-US" dirty="0"/>
+          </a:p>
+          <a:p>
+            <a:endParaRPr lang="en-US" dirty="0"/>
+          </a:p>
+          <a:p>
+            <a:endParaRPr lang="en-US" dirty="0"/>
+          </a:p>
+          <a:p>
+            <a:endParaRPr lang="en-US" dirty="0"/>
+          </a:p>
+          <a:p>
+            <a:endParaRPr lang="en-US" dirty="0"/>
+          </a:p>
+          <a:p>
+            <a:endParaRPr lang="en-US" dirty="0"/>
+          </a:p>
+          <a:p>
+            <a:endParaRPr lang="en-US" dirty="0"/>
+          </a:p>
+        </p:txBody>
+      </p:sp>
+      <p:sp>
+        <p:nvSpPr>
+          <p:cNvPr id="4" name="TextBox 3"/>
+          <p:cNvSpPr txBox="1"/>
+          <p:nvPr/>
+        </p:nvSpPr>
+        <p:spPr>
+          <a:xfrm>
+            <a:off x="398207" y="3325761"/>
+            <a:ext cx="3325761" cy="1477328"/>
+          </a:xfrm>
+          <a:prstGeom prst="rect">
+            <a:avLst/>
+          </a:prstGeom>
+          <a:noFill/>
+        </p:spPr>
+        <p:txBody>
+          <a:bodyPr wrap="square" rtlCol="0">
+            <a:spAutoFit/>
+          </a:bodyPr>
+          <a:lstStyle/>
+          <a:p>
+            <a:r>
+              <a:rPr lang="en-US" dirty="0"/>
+              <a:t>Contact Information</a:t>
+            </a:r>
+          </a:p>
+          <a:p>
+            <a:r>
+              <a:rPr lang="en-US" dirty="0">
+                <a:hlinkClick r:id="rId3"/>
+              </a:rPr>
+              <a:t>Ryan@sharepointknight.com</a:t>
+            </a:r>
+            <a:endParaRPr lang="en-US" dirty="0"/>
+          </a:p>
+          <a:p>
+            <a:r>
+              <a:rPr lang="en-US" dirty="0"/>
+              <a:t>@</a:t>
+            </a:r>
+            <a:r>
+              <a:rPr lang="en-US" dirty="0" err="1"/>
+              <a:t>shrpntknight</a:t>
+            </a:r>
+            <a:endParaRPr lang="en-US" dirty="0"/>
+          </a:p>
+          <a:p>
+            <a:r>
+              <a:rPr lang="en-US" dirty="0"/>
+              <a:t>http://www.sharepointknight.com</a:t>
+            </a:r>
+          </a:p>
+          <a:p>
+            <a:endParaRPr lang="en-US" dirty="0"/>
+          </a:p>
+        </p:txBody>
+      </p:sp>
+      <p:pic>
+        <p:nvPicPr>
+          <p:cNvPr id="5" name="Picture 4"/>
+          <p:cNvPicPr>
+            <a:picLocks noChangeAspect="1"/>
+          </p:cNvPicPr>
+          <p:nvPr/>
+        </p:nvPicPr>
+        <p:blipFill>
+          <a:blip r:embed="rId4">
+            <a:extLst>
+              <a:ext uri="{28A0092B-C50C-407E-A947-70E740481C1C}">
+                <a14:useLocalDpi xmlns:a14="http://schemas.microsoft.com/office/drawing/2010/main" val="0"/>
+              </a:ext>
+            </a:extLst>
+          </a:blip>
+          <a:stretch>
+            <a:fillRect/>
+          </a:stretch>
+        </p:blipFill>
+        <p:spPr>
+          <a:xfrm>
+            <a:off x="8789924" y="3630669"/>
+            <a:ext cx="1143000" cy="557213"/>
+          </a:xfrm>
+          <a:prstGeom prst="rect">
+            <a:avLst/>
+          </a:prstGeom>
+          <a:ln w="76200">
+            <a:solidFill>
+              <a:schemeClr val="bg1"/>
+            </a:solidFill>
+          </a:ln>
+        </p:spPr>
+      </p:pic>
+      <p:pic>
+        <p:nvPicPr>
+          <p:cNvPr id="6" name="Picture 5"/>
+          <p:cNvPicPr>
+            <a:picLocks noChangeAspect="1"/>
+          </p:cNvPicPr>
+          <p:nvPr/>
+        </p:nvPicPr>
+        <p:blipFill>
+          <a:blip r:embed="rId5">
+            <a:extLst>
+              <a:ext uri="{28A0092B-C50C-407E-A947-70E740481C1C}">
+                <a14:useLocalDpi xmlns:a14="http://schemas.microsoft.com/office/drawing/2010/main" val="0"/>
+              </a:ext>
+            </a:extLst>
+          </a:blip>
+          <a:stretch>
+            <a:fillRect/>
+          </a:stretch>
+        </p:blipFill>
+        <p:spPr>
+          <a:xfrm>
+            <a:off x="10248231" y="3337775"/>
+            <a:ext cx="1524000" cy="1143000"/>
+          </a:xfrm>
+          <a:prstGeom prst="rect">
+            <a:avLst/>
+          </a:prstGeom>
+        </p:spPr>
+      </p:pic>
+      <p:pic>
+        <p:nvPicPr>
+          <p:cNvPr id="7" name="Picture 6"/>
+          <p:cNvPicPr>
+            <a:picLocks noChangeAspect="1"/>
+          </p:cNvPicPr>
+          <p:nvPr/>
+        </p:nvPicPr>
+        <p:blipFill>
+          <a:blip r:embed="rId6">
+            <a:extLst>
+              <a:ext uri="{28A0092B-C50C-407E-A947-70E740481C1C}">
+                <a14:useLocalDpi xmlns:a14="http://schemas.microsoft.com/office/drawing/2010/main" val="0"/>
+              </a:ext>
+            </a:extLst>
+          </a:blip>
+          <a:stretch>
+            <a:fillRect/>
+          </a:stretch>
+        </p:blipFill>
+        <p:spPr>
+          <a:xfrm>
+            <a:off x="7049729" y="3328250"/>
+            <a:ext cx="1524000" cy="1162050"/>
+          </a:xfrm>
+          <a:prstGeom prst="rect">
+            <a:avLst/>
+          </a:prstGeom>
+        </p:spPr>
+      </p:pic>
+    </p:spTree>
+    <p:extLst>
+      <p:ext uri="{BB962C8B-B14F-4D97-AF65-F5344CB8AC3E}">
+        <p14:creationId xmlns:p14="http://schemas.microsoft.com/office/powerpoint/2010/main" val="2619045003"/>
+      </p:ext>
+    </p:extLst>
+  </p:cSld>
+  <p:clrMapOvr>
+    <a:masterClrMapping/>
+  </p:clrMapOvr>
+</p:sld>
+</file>
+
+<file path=ppt/slides/slide20.xml><?xml version="1.0" encoding="utf-8"?>
 <p:sld xmlns:a="http://schemas.openxmlformats.org/drawingml/2006/main" xmlns:r="http://schemas.openxmlformats.org/officeDocument/2006/relationships" xmlns:p="http://schemas.openxmlformats.org/presentationml/2006/main">
   <p:cSld>
     <p:spTree>
@@ -7048,7 +7735,7 @@
 </p:sld>
 </file>
 
-<file path=ppt/slides/slide17.xml><?xml version="1.0" encoding="utf-8"?>
+<file path=ppt/slides/slide21.xml><?xml version="1.0" encoding="utf-8"?>
 <p:sld xmlns:a="http://schemas.openxmlformats.org/drawingml/2006/main" xmlns:r="http://schemas.openxmlformats.org/officeDocument/2006/relationships" xmlns:p="http://schemas.openxmlformats.org/presentationml/2006/main">
   <p:cSld>
     <p:spTree>
@@ -7818,7 +8505,7 @@
 </p:sld>
 </file>
 
-<file path=ppt/slides/slide18.xml><?xml version="1.0" encoding="utf-8"?>
+<file path=ppt/slides/slide22.xml><?xml version="1.0" encoding="utf-8"?>
 <p:sld xmlns:a="http://schemas.openxmlformats.org/drawingml/2006/main" xmlns:r="http://schemas.openxmlformats.org/officeDocument/2006/relationships" xmlns:p="http://schemas.openxmlformats.org/presentationml/2006/main">
   <p:cSld>
     <p:spTree>
@@ -7877,7 +8564,131 @@
 </p:sld>
 </file>
 
-<file path=ppt/slides/slide19.xml><?xml version="1.0" encoding="utf-8"?>
+<file path=ppt/slides/slide23.xml><?xml version="1.0" encoding="utf-8"?>
+<p:sld xmlns:a="http://schemas.openxmlformats.org/drawingml/2006/main" xmlns:r="http://schemas.openxmlformats.org/officeDocument/2006/relationships" xmlns:p="http://schemas.openxmlformats.org/presentationml/2006/main">
+  <p:cSld>
+    <p:spTree>
+      <p:nvGrpSpPr>
+        <p:cNvPr id="1" name=""/>
+        <p:cNvGrpSpPr/>
+        <p:nvPr/>
+      </p:nvGrpSpPr>
+      <p:grpSpPr>
+        <a:xfrm>
+          <a:off x="0" y="0"/>
+          <a:ext cx="0" cy="0"/>
+          <a:chOff x="0" y="0"/>
+          <a:chExt cx="0" cy="0"/>
+        </a:xfrm>
+      </p:grpSpPr>
+      <p:sp>
+        <p:nvSpPr>
+          <p:cNvPr id="2" name="Title 1"/>
+          <p:cNvSpPr>
+            <a:spLocks noGrp="1"/>
+          </p:cNvSpPr>
+          <p:nvPr>
+            <p:ph type="title"/>
+          </p:nvPr>
+        </p:nvSpPr>
+        <p:spPr/>
+        <p:txBody>
+          <a:bodyPr/>
+          <a:lstStyle/>
+          <a:p>
+            <a:r>
+              <a:rPr lang="en-US" dirty="0"/>
+              <a:t>Thanks</a:t>
+            </a:r>
+          </a:p>
+        </p:txBody>
+      </p:sp>
+      <p:sp>
+        <p:nvSpPr>
+          <p:cNvPr id="3" name="Content Placeholder 2"/>
+          <p:cNvSpPr>
+            <a:spLocks noGrp="1"/>
+          </p:cNvSpPr>
+          <p:nvPr>
+            <p:ph idx="1"/>
+          </p:nvPr>
+        </p:nvSpPr>
+        <p:spPr/>
+        <p:txBody>
+          <a:bodyPr/>
+          <a:lstStyle/>
+          <a:p>
+            <a:r>
+              <a:rPr lang="en-US" sz="2400" dirty="0"/>
+              <a:t>Thank you for attending</a:t>
+            </a:r>
+          </a:p>
+          <a:p>
+            <a:endParaRPr lang="en-US" sz="2400" dirty="0"/>
+          </a:p>
+          <a:p>
+            <a:pPr marL="0" indent="0">
+              <a:buNone/>
+            </a:pPr>
+            <a:r>
+              <a:rPr lang="en-US" dirty="0"/>
+              <a:t>Contact Information</a:t>
+            </a:r>
+          </a:p>
+          <a:p>
+            <a:pPr marL="0" indent="0">
+              <a:buNone/>
+            </a:pPr>
+            <a:r>
+              <a:rPr lang="en-US" dirty="0">
+                <a:hlinkClick r:id="rId2"/>
+              </a:rPr>
+              <a:t>Ryan@sharepointknight.com</a:t>
+            </a:r>
+            <a:endParaRPr lang="en-US" dirty="0"/>
+          </a:p>
+          <a:p>
+            <a:pPr marL="0" indent="0">
+              <a:buNone/>
+            </a:pPr>
+            <a:r>
+              <a:rPr lang="en-US" dirty="0"/>
+              <a:t>@</a:t>
+            </a:r>
+            <a:r>
+              <a:rPr lang="en-US" dirty="0" err="1"/>
+              <a:t>shrpntknight</a:t>
+            </a:r>
+            <a:endParaRPr lang="en-US" dirty="0"/>
+          </a:p>
+          <a:p>
+            <a:pPr marL="0" indent="0">
+              <a:buNone/>
+            </a:pPr>
+            <a:r>
+              <a:rPr lang="en-US" dirty="0"/>
+              <a:t>http://www.sharepointknight.com</a:t>
+            </a:r>
+          </a:p>
+          <a:p>
+            <a:endParaRPr lang="en-US" dirty="0"/>
+          </a:p>
+        </p:txBody>
+      </p:sp>
+    </p:spTree>
+    <p:extLst>
+      <p:ext uri="{BB962C8B-B14F-4D97-AF65-F5344CB8AC3E}">
+        <p14:creationId xmlns:p14="http://schemas.microsoft.com/office/powerpoint/2010/main" val="453244623"/>
+      </p:ext>
+    </p:extLst>
+  </p:cSld>
+  <p:clrMapOvr>
+    <a:masterClrMapping/>
+  </p:clrMapOvr>
+</p:sld>
+</file>
+
+<file path=ppt/slides/slide24.xml><?xml version="1.0" encoding="utf-8"?>
 <p:sld xmlns:a="http://schemas.openxmlformats.org/drawingml/2006/main" xmlns:r="http://schemas.openxmlformats.org/officeDocument/2006/relationships" xmlns:p="http://schemas.openxmlformats.org/presentationml/2006/main">
   <p:cSld>
     <p:spTree>
@@ -7998,1363 +8809,6 @@
   <p:transition spd="slow">
     <p:wipe/>
   </p:transition>
-</p:sld>
-</file>
-
-<file path=ppt/slides/slide2.xml><?xml version="1.0" encoding="utf-8"?>
-<p:sld xmlns:a="http://schemas.openxmlformats.org/drawingml/2006/main" xmlns:r="http://schemas.openxmlformats.org/officeDocument/2006/relationships" xmlns:p="http://schemas.openxmlformats.org/presentationml/2006/main">
-  <p:cSld>
-    <p:spTree>
-      <p:nvGrpSpPr>
-        <p:cNvPr id="1" name=""/>
-        <p:cNvGrpSpPr/>
-        <p:nvPr/>
-      </p:nvGrpSpPr>
-      <p:grpSpPr>
-        <a:xfrm>
-          <a:off x="0" y="0"/>
-          <a:ext cx="0" cy="0"/>
-          <a:chOff x="0" y="0"/>
-          <a:chExt cx="0" cy="0"/>
-        </a:xfrm>
-      </p:grpSpPr>
-      <p:pic>
-        <p:nvPicPr>
-          <p:cNvPr id="2" name="Picture 1"/>
-          <p:cNvPicPr>
-            <a:picLocks noChangeAspect="1"/>
-          </p:cNvPicPr>
-          <p:nvPr/>
-        </p:nvPicPr>
-        <p:blipFill>
-          <a:blip r:embed="rId2"/>
-          <a:stretch>
-            <a:fillRect/>
-          </a:stretch>
-        </p:blipFill>
-        <p:spPr>
-          <a:xfrm>
-            <a:off x="398207" y="174419"/>
-            <a:ext cx="2617839" cy="2617839"/>
-          </a:xfrm>
-          <a:prstGeom prst="ellipse">
-            <a:avLst/>
-          </a:prstGeom>
-          <a:ln>
-            <a:noFill/>
-          </a:ln>
-          <a:effectLst>
-            <a:softEdge rad="112500"/>
-          </a:effectLst>
-        </p:spPr>
-      </p:pic>
-      <p:sp>
-        <p:nvSpPr>
-          <p:cNvPr id="3" name="TextBox 2"/>
-          <p:cNvSpPr txBox="1"/>
-          <p:nvPr/>
-        </p:nvSpPr>
-        <p:spPr>
-          <a:xfrm>
-            <a:off x="3723968" y="508820"/>
-            <a:ext cx="7175090" cy="4585871"/>
-          </a:xfrm>
-          <a:prstGeom prst="rect">
-            <a:avLst/>
-          </a:prstGeom>
-          <a:noFill/>
-        </p:spPr>
-        <p:txBody>
-          <a:bodyPr wrap="square" rtlCol="0">
-            <a:spAutoFit/>
-          </a:bodyPr>
-          <a:lstStyle/>
-          <a:p>
-            <a:r>
-              <a:rPr lang="en-US" sz="4000" dirty="0"/>
-              <a:t>Ryan Schouten</a:t>
-            </a:r>
-          </a:p>
-          <a:p>
-            <a:endParaRPr lang="en-US" dirty="0"/>
-          </a:p>
-          <a:p>
-            <a:r>
-              <a:rPr lang="en-US" dirty="0"/>
-              <a:t>Utah SharePoint User Group President</a:t>
-            </a:r>
-          </a:p>
-          <a:p>
-            <a:endParaRPr lang="en-US" dirty="0"/>
-          </a:p>
-          <a:p>
-            <a:r>
-              <a:rPr lang="en-US" dirty="0"/>
-              <a:t>Worked with SharePoint for 10 years</a:t>
-            </a:r>
-          </a:p>
-          <a:p>
-            <a:r>
-              <a:rPr lang="en-US" dirty="0"/>
-              <a:t>I have experience with SharePoint 2003 – 2016</a:t>
-            </a:r>
-          </a:p>
-          <a:p>
-            <a:r>
-              <a:rPr lang="en-US" dirty="0"/>
-              <a:t>I have worked with </a:t>
-            </a:r>
-            <a:r>
-              <a:rPr lang="en-US" dirty="0" err="1"/>
-              <a:t>ASP.Net</a:t>
-            </a:r>
-            <a:r>
-              <a:rPr lang="en-US" dirty="0"/>
-              <a:t> for 15 years</a:t>
-            </a:r>
-          </a:p>
-          <a:p>
-            <a:endParaRPr lang="en-US" dirty="0"/>
-          </a:p>
-          <a:p>
-            <a:endParaRPr lang="en-US" dirty="0"/>
-          </a:p>
-          <a:p>
-            <a:endParaRPr lang="en-US" dirty="0"/>
-          </a:p>
-          <a:p>
-            <a:endParaRPr lang="en-US" dirty="0"/>
-          </a:p>
-          <a:p>
-            <a:endParaRPr lang="en-US" dirty="0"/>
-          </a:p>
-          <a:p>
-            <a:endParaRPr lang="en-US" dirty="0"/>
-          </a:p>
-          <a:p>
-            <a:endParaRPr lang="en-US" dirty="0"/>
-          </a:p>
-          <a:p>
-            <a:endParaRPr lang="en-US" dirty="0"/>
-          </a:p>
-        </p:txBody>
-      </p:sp>
-      <p:sp>
-        <p:nvSpPr>
-          <p:cNvPr id="4" name="TextBox 3"/>
-          <p:cNvSpPr txBox="1"/>
-          <p:nvPr/>
-        </p:nvSpPr>
-        <p:spPr>
-          <a:xfrm>
-            <a:off x="398207" y="3325761"/>
-            <a:ext cx="3325761" cy="1477328"/>
-          </a:xfrm>
-          <a:prstGeom prst="rect">
-            <a:avLst/>
-          </a:prstGeom>
-          <a:noFill/>
-        </p:spPr>
-        <p:txBody>
-          <a:bodyPr wrap="square" rtlCol="0">
-            <a:spAutoFit/>
-          </a:bodyPr>
-          <a:lstStyle/>
-          <a:p>
-            <a:r>
-              <a:rPr lang="en-US" dirty="0"/>
-              <a:t>Contact Information</a:t>
-            </a:r>
-          </a:p>
-          <a:p>
-            <a:r>
-              <a:rPr lang="en-US" dirty="0">
-                <a:hlinkClick r:id="rId3"/>
-              </a:rPr>
-              <a:t>Ryan@sharepointknight.com</a:t>
-            </a:r>
-            <a:endParaRPr lang="en-US" dirty="0"/>
-          </a:p>
-          <a:p>
-            <a:r>
-              <a:rPr lang="en-US" dirty="0"/>
-              <a:t>@</a:t>
-            </a:r>
-            <a:r>
-              <a:rPr lang="en-US" dirty="0" err="1"/>
-              <a:t>shrpntknight</a:t>
-            </a:r>
-            <a:endParaRPr lang="en-US" dirty="0"/>
-          </a:p>
-          <a:p>
-            <a:r>
-              <a:rPr lang="en-US" dirty="0"/>
-              <a:t>http://www.sharepointknight.com</a:t>
-            </a:r>
-          </a:p>
-          <a:p>
-            <a:endParaRPr lang="en-US" dirty="0"/>
-          </a:p>
-        </p:txBody>
-      </p:sp>
-      <p:pic>
-        <p:nvPicPr>
-          <p:cNvPr id="5" name="Picture 4"/>
-          <p:cNvPicPr>
-            <a:picLocks noChangeAspect="1"/>
-          </p:cNvPicPr>
-          <p:nvPr/>
-        </p:nvPicPr>
-        <p:blipFill>
-          <a:blip r:embed="rId4">
-            <a:extLst>
-              <a:ext uri="{28A0092B-C50C-407E-A947-70E740481C1C}">
-                <a14:useLocalDpi xmlns:a14="http://schemas.microsoft.com/office/drawing/2010/main" val="0"/>
-              </a:ext>
-            </a:extLst>
-          </a:blip>
-          <a:stretch>
-            <a:fillRect/>
-          </a:stretch>
-        </p:blipFill>
-        <p:spPr>
-          <a:xfrm>
-            <a:off x="8789924" y="3630669"/>
-            <a:ext cx="1143000" cy="557213"/>
-          </a:xfrm>
-          <a:prstGeom prst="rect">
-            <a:avLst/>
-          </a:prstGeom>
-          <a:ln w="76200">
-            <a:solidFill>
-              <a:schemeClr val="bg1"/>
-            </a:solidFill>
-          </a:ln>
-        </p:spPr>
-      </p:pic>
-      <p:pic>
-        <p:nvPicPr>
-          <p:cNvPr id="6" name="Picture 5"/>
-          <p:cNvPicPr>
-            <a:picLocks noChangeAspect="1"/>
-          </p:cNvPicPr>
-          <p:nvPr/>
-        </p:nvPicPr>
-        <p:blipFill>
-          <a:blip r:embed="rId5">
-            <a:extLst>
-              <a:ext uri="{28A0092B-C50C-407E-A947-70E740481C1C}">
-                <a14:useLocalDpi xmlns:a14="http://schemas.microsoft.com/office/drawing/2010/main" val="0"/>
-              </a:ext>
-            </a:extLst>
-          </a:blip>
-          <a:stretch>
-            <a:fillRect/>
-          </a:stretch>
-        </p:blipFill>
-        <p:spPr>
-          <a:xfrm>
-            <a:off x="10248231" y="3337775"/>
-            <a:ext cx="1524000" cy="1143000"/>
-          </a:xfrm>
-          <a:prstGeom prst="rect">
-            <a:avLst/>
-          </a:prstGeom>
-        </p:spPr>
-      </p:pic>
-      <p:pic>
-        <p:nvPicPr>
-          <p:cNvPr id="7" name="Picture 6"/>
-          <p:cNvPicPr>
-            <a:picLocks noChangeAspect="1"/>
-          </p:cNvPicPr>
-          <p:nvPr/>
-        </p:nvPicPr>
-        <p:blipFill>
-          <a:blip r:embed="rId6">
-            <a:extLst>
-              <a:ext uri="{28A0092B-C50C-407E-A947-70E740481C1C}">
-                <a14:useLocalDpi xmlns:a14="http://schemas.microsoft.com/office/drawing/2010/main" val="0"/>
-              </a:ext>
-            </a:extLst>
-          </a:blip>
-          <a:stretch>
-            <a:fillRect/>
-          </a:stretch>
-        </p:blipFill>
-        <p:spPr>
-          <a:xfrm>
-            <a:off x="7049729" y="3328250"/>
-            <a:ext cx="1524000" cy="1162050"/>
-          </a:xfrm>
-          <a:prstGeom prst="rect">
-            <a:avLst/>
-          </a:prstGeom>
-        </p:spPr>
-      </p:pic>
-    </p:spTree>
-    <p:extLst>
-      <p:ext uri="{BB962C8B-B14F-4D97-AF65-F5344CB8AC3E}">
-        <p14:creationId xmlns:p14="http://schemas.microsoft.com/office/powerpoint/2010/main" val="2619045003"/>
-      </p:ext>
-    </p:extLst>
-  </p:cSld>
-  <p:clrMapOvr>
-    <a:masterClrMapping/>
-  </p:clrMapOvr>
-</p:sld>
-</file>
-
-<file path=ppt/slides/slide20.xml><?xml version="1.0" encoding="utf-8"?>
-<p:sld xmlns:a="http://schemas.openxmlformats.org/drawingml/2006/main" xmlns:r="http://schemas.openxmlformats.org/officeDocument/2006/relationships" xmlns:p="http://schemas.openxmlformats.org/presentationml/2006/main">
-  <p:cSld>
-    <p:spTree>
-      <p:nvGrpSpPr>
-        <p:cNvPr id="1" name=""/>
-        <p:cNvGrpSpPr/>
-        <p:nvPr/>
-      </p:nvGrpSpPr>
-      <p:grpSpPr>
-        <a:xfrm>
-          <a:off x="0" y="0"/>
-          <a:ext cx="0" cy="0"/>
-          <a:chOff x="0" y="0"/>
-          <a:chExt cx="0" cy="0"/>
-        </a:xfrm>
-      </p:grpSpPr>
-      <p:sp>
-        <p:nvSpPr>
-          <p:cNvPr id="2" name="Title 1"/>
-          <p:cNvSpPr>
-            <a:spLocks noGrp="1"/>
-          </p:cNvSpPr>
-          <p:nvPr>
-            <p:ph type="title"/>
-          </p:nvPr>
-        </p:nvSpPr>
-        <p:spPr/>
-        <p:txBody>
-          <a:bodyPr/>
-          <a:lstStyle/>
-          <a:p>
-            <a:r>
-              <a:rPr lang="en-US" dirty="0"/>
-              <a:t>Thanks</a:t>
-            </a:r>
-          </a:p>
-        </p:txBody>
-      </p:sp>
-      <p:sp>
-        <p:nvSpPr>
-          <p:cNvPr id="3" name="Content Placeholder 2"/>
-          <p:cNvSpPr>
-            <a:spLocks noGrp="1"/>
-          </p:cNvSpPr>
-          <p:nvPr>
-            <p:ph idx="1"/>
-          </p:nvPr>
-        </p:nvSpPr>
-        <p:spPr/>
-        <p:txBody>
-          <a:bodyPr/>
-          <a:lstStyle/>
-          <a:p>
-            <a:r>
-              <a:rPr lang="en-US" sz="2400" dirty="0"/>
-              <a:t>Thank your for attending SharePoint Fest</a:t>
-            </a:r>
-          </a:p>
-          <a:p>
-            <a:endParaRPr lang="en-US" sz="2400" dirty="0"/>
-          </a:p>
-          <a:p>
-            <a:pPr marL="0" indent="0">
-              <a:buNone/>
-            </a:pPr>
-            <a:r>
-              <a:rPr lang="en-US" dirty="0"/>
-              <a:t>Contact Information</a:t>
-            </a:r>
-          </a:p>
-          <a:p>
-            <a:pPr marL="0" indent="0">
-              <a:buNone/>
-            </a:pPr>
-            <a:r>
-              <a:rPr lang="en-US" dirty="0">
-                <a:hlinkClick r:id="rId2"/>
-              </a:rPr>
-              <a:t>Ryan@sharepointknight.com</a:t>
-            </a:r>
-            <a:endParaRPr lang="en-US" dirty="0"/>
-          </a:p>
-          <a:p>
-            <a:pPr marL="0" indent="0">
-              <a:buNone/>
-            </a:pPr>
-            <a:r>
-              <a:rPr lang="en-US" dirty="0"/>
-              <a:t>@</a:t>
-            </a:r>
-            <a:r>
-              <a:rPr lang="en-US" dirty="0" err="1"/>
-              <a:t>shrpntknight</a:t>
-            </a:r>
-            <a:endParaRPr lang="en-US" dirty="0"/>
-          </a:p>
-          <a:p>
-            <a:pPr marL="0" indent="0">
-              <a:buNone/>
-            </a:pPr>
-            <a:r>
-              <a:rPr lang="en-US" dirty="0"/>
-              <a:t>http://www.sharepointknight.com</a:t>
-            </a:r>
-          </a:p>
-          <a:p>
-            <a:endParaRPr lang="en-US" dirty="0"/>
-          </a:p>
-        </p:txBody>
-      </p:sp>
-    </p:spTree>
-    <p:extLst>
-      <p:ext uri="{BB962C8B-B14F-4D97-AF65-F5344CB8AC3E}">
-        <p14:creationId xmlns:p14="http://schemas.microsoft.com/office/powerpoint/2010/main" val="453244623"/>
-      </p:ext>
-    </p:extLst>
-  </p:cSld>
-  <p:clrMapOvr>
-    <a:masterClrMapping/>
-  </p:clrMapOvr>
-</p:sld>
-</file>
-
-<file path=ppt/slides/slide21.xml><?xml version="1.0" encoding="utf-8"?>
-<p:sld xmlns:a="http://schemas.openxmlformats.org/drawingml/2006/main" xmlns:r="http://schemas.openxmlformats.org/officeDocument/2006/relationships" xmlns:p="http://schemas.openxmlformats.org/presentationml/2006/main">
-  <p:cSld>
-    <p:spTree>
-      <p:nvGrpSpPr>
-        <p:cNvPr id="1" name=""/>
-        <p:cNvGrpSpPr/>
-        <p:nvPr/>
-      </p:nvGrpSpPr>
-      <p:grpSpPr>
-        <a:xfrm>
-          <a:off x="0" y="0"/>
-          <a:ext cx="0" cy="0"/>
-          <a:chOff x="0" y="0"/>
-          <a:chExt cx="0" cy="0"/>
-        </a:xfrm>
-      </p:grpSpPr>
-      <p:sp>
-        <p:nvSpPr>
-          <p:cNvPr id="8" name="Rectangle 7"/>
-          <p:cNvSpPr/>
-          <p:nvPr/>
-        </p:nvSpPr>
-        <p:spPr>
-          <a:xfrm>
-            <a:off x="1833046" y="740650"/>
-            <a:ext cx="8564315" cy="5963388"/>
-          </a:xfrm>
-          <a:prstGeom prst="rect">
-            <a:avLst/>
-          </a:prstGeom>
-          <a:solidFill>
-            <a:schemeClr val="bg1"/>
-          </a:solidFill>
-          <a:ln>
-            <a:noFill/>
-          </a:ln>
-          <a:effectLst>
-            <a:outerShdw blurRad="190500" sx="99000" sy="99000" algn="ctr" rotWithShape="0">
-              <a:prstClr val="black">
-                <a:alpha val="40000"/>
-              </a:prstClr>
-            </a:outerShdw>
-          </a:effectLst>
-        </p:spPr>
-        <p:style>
-          <a:lnRef idx="2">
-            <a:schemeClr val="accent1">
-              <a:shade val="50000"/>
-            </a:schemeClr>
-          </a:lnRef>
-          <a:fillRef idx="1">
-            <a:schemeClr val="accent1"/>
-          </a:fillRef>
-          <a:effectRef idx="0">
-            <a:schemeClr val="accent1"/>
-          </a:effectRef>
-          <a:fontRef idx="minor">
-            <a:schemeClr val="lt1"/>
-          </a:fontRef>
-        </p:style>
-        <p:txBody>
-          <a:bodyPr rtlCol="0" anchor="ctr"/>
-          <a:lstStyle/>
-          <a:p>
-            <a:pPr algn="ctr" defTabSz="914400"/>
-            <a:endParaRPr lang="en-US">
-              <a:solidFill>
-                <a:prstClr val="white"/>
-              </a:solidFill>
-              <a:latin typeface="Calibri"/>
-            </a:endParaRPr>
-          </a:p>
-        </p:txBody>
-      </p:sp>
-      <p:sp>
-        <p:nvSpPr>
-          <p:cNvPr id="5" name="Rectangle 4"/>
-          <p:cNvSpPr/>
-          <p:nvPr/>
-        </p:nvSpPr>
-        <p:spPr>
-          <a:xfrm>
-            <a:off x="1524000" y="6178838"/>
-            <a:ext cx="9144000" cy="678820"/>
-          </a:xfrm>
-          <a:prstGeom prst="rect">
-            <a:avLst/>
-          </a:prstGeom>
-          <a:solidFill>
-            <a:schemeClr val="tx1">
-              <a:lumMod val="75000"/>
-              <a:lumOff val="25000"/>
-            </a:schemeClr>
-          </a:solidFill>
-          <a:ln>
-            <a:noFill/>
-          </a:ln>
-          <a:effectLst>
-            <a:outerShdw blurRad="63500" sx="102000" sy="102000" algn="ctr" rotWithShape="0">
-              <a:prstClr val="black">
-                <a:alpha val="40000"/>
-              </a:prstClr>
-            </a:outerShdw>
-          </a:effectLst>
-        </p:spPr>
-        <p:style>
-          <a:lnRef idx="2">
-            <a:schemeClr val="accent1">
-              <a:shade val="50000"/>
-            </a:schemeClr>
-          </a:lnRef>
-          <a:fillRef idx="1">
-            <a:schemeClr val="accent1"/>
-          </a:fillRef>
-          <a:effectRef idx="0">
-            <a:schemeClr val="accent1"/>
-          </a:effectRef>
-          <a:fontRef idx="minor">
-            <a:schemeClr val="lt1"/>
-          </a:fontRef>
-        </p:style>
-        <p:txBody>
-          <a:bodyPr rtlCol="0" anchor="ctr"/>
-          <a:lstStyle/>
-          <a:p>
-            <a:pPr algn="ctr" defTabSz="914400"/>
-            <a:endParaRPr lang="en-US">
-              <a:solidFill>
-                <a:prstClr val="white"/>
-              </a:solidFill>
-              <a:latin typeface="Calibri"/>
-            </a:endParaRPr>
-          </a:p>
-        </p:txBody>
-      </p:sp>
-      <p:sp>
-        <p:nvSpPr>
-          <p:cNvPr id="9" name="TextBox 8"/>
-          <p:cNvSpPr txBox="1"/>
-          <p:nvPr/>
-        </p:nvSpPr>
-        <p:spPr>
-          <a:xfrm>
-            <a:off x="1756237" y="10955"/>
-            <a:ext cx="3840499" cy="707886"/>
-          </a:xfrm>
-          <a:prstGeom prst="rect">
-            <a:avLst/>
-          </a:prstGeom>
-          <a:noFill/>
-        </p:spPr>
-        <p:txBody>
-          <a:bodyPr wrap="square" rtlCol="0">
-            <a:spAutoFit/>
-          </a:bodyPr>
-          <a:lstStyle/>
-          <a:p>
-            <a:pPr defTabSz="914400"/>
-            <a:r>
-              <a:rPr lang="en-US" sz="4000" kern="3000" spc="30" dirty="0">
-                <a:solidFill>
-                  <a:prstClr val="black">
-                    <a:lumMod val="75000"/>
-                    <a:lumOff val="25000"/>
-                  </a:prstClr>
-                </a:solidFill>
-                <a:latin typeface="Rockwell" pitchFamily="18" charset="0"/>
-              </a:rPr>
-              <a:t>Surveys</a:t>
-            </a:r>
-          </a:p>
-        </p:txBody>
-      </p:sp>
-      <p:cxnSp>
-        <p:nvCxnSpPr>
-          <p:cNvPr id="11" name="Straight Connector 10"/>
-          <p:cNvCxnSpPr/>
-          <p:nvPr/>
-        </p:nvCxnSpPr>
-        <p:spPr>
-          <a:xfrm>
-            <a:off x="4290965" y="202981"/>
-            <a:ext cx="0" cy="399305"/>
-          </a:xfrm>
-          <a:prstGeom prst="line">
-            <a:avLst/>
-          </a:prstGeom>
-          <a:ln w="3175">
-            <a:solidFill>
-              <a:schemeClr val="tx1">
-                <a:lumMod val="75000"/>
-                <a:lumOff val="25000"/>
-              </a:schemeClr>
-            </a:solidFill>
-            <a:prstDash val="sysDot"/>
-          </a:ln>
-        </p:spPr>
-        <p:style>
-          <a:lnRef idx="1">
-            <a:schemeClr val="accent1"/>
-          </a:lnRef>
-          <a:fillRef idx="0">
-            <a:schemeClr val="accent1"/>
-          </a:fillRef>
-          <a:effectRef idx="0">
-            <a:schemeClr val="accent1"/>
-          </a:effectRef>
-          <a:fontRef idx="minor">
-            <a:schemeClr val="tx1"/>
-          </a:fontRef>
-        </p:style>
-      </p:cxnSp>
-      <p:sp>
-        <p:nvSpPr>
-          <p:cNvPr id="12" name="Rectangle 11"/>
-          <p:cNvSpPr/>
-          <p:nvPr/>
-        </p:nvSpPr>
-        <p:spPr>
-          <a:xfrm>
-            <a:off x="1833046" y="740651"/>
-            <a:ext cx="8564315" cy="960125"/>
-          </a:xfrm>
-          <a:prstGeom prst="rect">
-            <a:avLst/>
-          </a:prstGeom>
-          <a:solidFill>
-            <a:schemeClr val="tx1">
-              <a:lumMod val="75000"/>
-              <a:lumOff val="25000"/>
-            </a:schemeClr>
-          </a:solidFill>
-          <a:ln>
-            <a:noFill/>
-          </a:ln>
-        </p:spPr>
-        <p:style>
-          <a:lnRef idx="2">
-            <a:schemeClr val="accent1">
-              <a:shade val="50000"/>
-            </a:schemeClr>
-          </a:lnRef>
-          <a:fillRef idx="1">
-            <a:schemeClr val="accent1"/>
-          </a:fillRef>
-          <a:effectRef idx="0">
-            <a:schemeClr val="accent1"/>
-          </a:effectRef>
-          <a:fontRef idx="minor">
-            <a:schemeClr val="lt1"/>
-          </a:fontRef>
-        </p:style>
-        <p:txBody>
-          <a:bodyPr rtlCol="0" anchor="ctr"/>
-          <a:lstStyle/>
-          <a:p>
-            <a:pPr defTabSz="914400"/>
-            <a:endParaRPr lang="en-US" sz="1400">
-              <a:solidFill>
-                <a:prstClr val="white">
-                  <a:lumMod val="95000"/>
-                </a:prstClr>
-              </a:solidFill>
-              <a:latin typeface="Calibri"/>
-            </a:endParaRPr>
-          </a:p>
-        </p:txBody>
-      </p:sp>
-      <p:cxnSp>
-        <p:nvCxnSpPr>
-          <p:cNvPr id="24" name="Straight Connector 23"/>
-          <p:cNvCxnSpPr/>
-          <p:nvPr/>
-        </p:nvCxnSpPr>
-        <p:spPr>
-          <a:xfrm>
-            <a:off x="9590855" y="6270971"/>
-            <a:ext cx="0" cy="499265"/>
-          </a:xfrm>
-          <a:prstGeom prst="line">
-            <a:avLst/>
-          </a:prstGeom>
-          <a:ln w="3175">
-            <a:solidFill>
-              <a:schemeClr val="bg1">
-                <a:lumMod val="95000"/>
-              </a:schemeClr>
-            </a:solidFill>
-            <a:prstDash val="sysDot"/>
-          </a:ln>
-        </p:spPr>
-        <p:style>
-          <a:lnRef idx="1">
-            <a:schemeClr val="accent1"/>
-          </a:lnRef>
-          <a:fillRef idx="0">
-            <a:schemeClr val="accent1"/>
-          </a:fillRef>
-          <a:effectRef idx="0">
-            <a:schemeClr val="accent1"/>
-          </a:effectRef>
-          <a:fontRef idx="minor">
-            <a:schemeClr val="tx1"/>
-          </a:fontRef>
-        </p:style>
-      </p:cxnSp>
-      <p:sp>
-        <p:nvSpPr>
-          <p:cNvPr id="25" name="Slide Number Placeholder 24"/>
-          <p:cNvSpPr>
-            <a:spLocks noGrp="1"/>
-          </p:cNvSpPr>
-          <p:nvPr>
-            <p:ph type="sldNum" sz="quarter" idx="12"/>
-          </p:nvPr>
-        </p:nvSpPr>
-        <p:spPr>
-          <a:xfrm>
-            <a:off x="8169870" y="6356351"/>
-            <a:ext cx="2133600" cy="365125"/>
-          </a:xfrm>
-        </p:spPr>
-        <p:txBody>
-          <a:bodyPr/>
-          <a:lstStyle/>
-          <a:p>
-            <a:pPr defTabSz="914400"/>
-            <a:fld id="{A9ED3ADD-7DE1-476D-98AF-452DDE8572DE}" type="slidenum">
-              <a:rPr lang="en-US" sz="1600">
-                <a:solidFill>
-                  <a:prstClr val="white">
-                    <a:lumMod val="95000"/>
-                  </a:prstClr>
-                </a:solidFill>
-                <a:effectLst>
-                  <a:outerShdw blurRad="50800" dist="38100" dir="5400000" algn="t" rotWithShape="0">
-                    <a:prstClr val="black">
-                      <a:alpha val="40000"/>
-                    </a:prstClr>
-                  </a:outerShdw>
-                </a:effectLst>
-                <a:latin typeface="Rockwell" pitchFamily="18" charset="0"/>
-              </a:rPr>
-              <a:pPr defTabSz="914400"/>
-              <a:t>21</a:t>
-            </a:fld>
-            <a:endParaRPr lang="en-US" sz="1600">
-              <a:solidFill>
-                <a:prstClr val="white">
-                  <a:lumMod val="95000"/>
-                </a:prstClr>
-              </a:solidFill>
-              <a:effectLst>
-                <a:outerShdw blurRad="50800" dist="38100" dir="5400000" algn="t" rotWithShape="0">
-                  <a:prstClr val="black">
-                    <a:alpha val="40000"/>
-                  </a:prstClr>
-                </a:outerShdw>
-              </a:effectLst>
-              <a:latin typeface="Rockwell" pitchFamily="18" charset="0"/>
-            </a:endParaRPr>
-          </a:p>
-        </p:txBody>
-      </p:sp>
-      <p:sp>
-        <p:nvSpPr>
-          <p:cNvPr id="3" name="TextBox 2"/>
-          <p:cNvSpPr txBox="1"/>
-          <p:nvPr/>
-        </p:nvSpPr>
-        <p:spPr>
-          <a:xfrm>
-            <a:off x="1997316" y="909910"/>
-            <a:ext cx="8169614" cy="646331"/>
-          </a:xfrm>
-          <a:prstGeom prst="rect">
-            <a:avLst/>
-          </a:prstGeom>
-          <a:noFill/>
-        </p:spPr>
-        <p:txBody>
-          <a:bodyPr wrap="square" rtlCol="0">
-            <a:spAutoFit/>
-          </a:bodyPr>
-          <a:lstStyle/>
-          <a:p>
-            <a:pPr defTabSz="914400"/>
-            <a:r>
-              <a:rPr lang="en-US" sz="3600" kern="3000" spc="30" dirty="0">
-                <a:solidFill>
-                  <a:srgbClr val="1F497D">
-                    <a:lumMod val="20000"/>
-                    <a:lumOff val="80000"/>
-                  </a:srgbClr>
-                </a:solidFill>
-                <a:latin typeface="Rockwell" pitchFamily="18" charset="0"/>
-              </a:rPr>
-              <a:t>Feedback Please!</a:t>
-            </a:r>
-          </a:p>
-        </p:txBody>
-      </p:sp>
-      <p:cxnSp>
-        <p:nvCxnSpPr>
-          <p:cNvPr id="27" name="Straight Connector 26"/>
-          <p:cNvCxnSpPr/>
-          <p:nvPr/>
-        </p:nvCxnSpPr>
-        <p:spPr>
-          <a:xfrm>
-            <a:off x="3254030" y="6270971"/>
-            <a:ext cx="0" cy="499265"/>
-          </a:xfrm>
-          <a:prstGeom prst="line">
-            <a:avLst/>
-          </a:prstGeom>
-          <a:ln w="3175">
-            <a:solidFill>
-              <a:schemeClr val="bg1">
-                <a:lumMod val="95000"/>
-              </a:schemeClr>
-            </a:solidFill>
-            <a:prstDash val="sysDot"/>
-          </a:ln>
-        </p:spPr>
-        <p:style>
-          <a:lnRef idx="1">
-            <a:schemeClr val="accent1"/>
-          </a:lnRef>
-          <a:fillRef idx="0">
-            <a:schemeClr val="accent1"/>
-          </a:fillRef>
-          <a:effectRef idx="0">
-            <a:schemeClr val="accent1"/>
-          </a:effectRef>
-          <a:fontRef idx="minor">
-            <a:schemeClr val="tx1"/>
-          </a:fontRef>
-        </p:style>
-      </p:cxnSp>
-      <p:sp>
-        <p:nvSpPr>
-          <p:cNvPr id="29" name="TextBox 28"/>
-          <p:cNvSpPr txBox="1"/>
-          <p:nvPr/>
-        </p:nvSpPr>
-        <p:spPr>
-          <a:xfrm>
-            <a:off x="1909856" y="1864959"/>
-            <a:ext cx="5184675" cy="3970318"/>
-          </a:xfrm>
-          <a:prstGeom prst="rect">
-            <a:avLst/>
-          </a:prstGeom>
-          <a:noFill/>
-        </p:spPr>
-        <p:txBody>
-          <a:bodyPr wrap="square" rtlCol="0">
-            <a:spAutoFit/>
-          </a:bodyPr>
-          <a:lstStyle/>
-          <a:p>
-            <a:pPr defTabSz="914400"/>
-            <a:r>
-              <a:rPr lang="en-US" sz="2400" dirty="0">
-                <a:solidFill>
-                  <a:prstClr val="black"/>
-                </a:solidFill>
-                <a:latin typeface="Calibri"/>
-              </a:rPr>
-              <a:t>Session Surveys via Event App</a:t>
-            </a:r>
-          </a:p>
-          <a:p>
-            <a:pPr lvl="1" defTabSz="914400"/>
-            <a:r>
-              <a:rPr lang="en-US" sz="2400" dirty="0">
-                <a:solidFill>
-                  <a:prstClr val="black"/>
-                </a:solidFill>
-                <a:latin typeface="Calibri"/>
-              </a:rPr>
-              <a:t>Select “Schedule” -&gt; Select Session               -&gt; Scroll to “Session Survey”</a:t>
-            </a:r>
-          </a:p>
-          <a:p>
-            <a:pPr defTabSz="914400"/>
-            <a:endParaRPr lang="en-US" sz="2400" dirty="0">
-              <a:solidFill>
-                <a:prstClr val="black"/>
-              </a:solidFill>
-              <a:latin typeface="Calibri"/>
-            </a:endParaRPr>
-          </a:p>
-          <a:p>
-            <a:pPr defTabSz="914400"/>
-            <a:r>
-              <a:rPr lang="en-US" sz="2400" dirty="0">
-                <a:solidFill>
-                  <a:prstClr val="black"/>
-                </a:solidFill>
-                <a:latin typeface="Calibri"/>
-              </a:rPr>
-              <a:t>Download the App:</a:t>
-            </a:r>
-          </a:p>
-          <a:p>
-            <a:pPr lvl="1" defTabSz="914400"/>
-            <a:r>
-              <a:rPr lang="en-US" sz="2400" dirty="0">
-                <a:solidFill>
-                  <a:prstClr val="black"/>
-                </a:solidFill>
-                <a:latin typeface="Calibri"/>
-              </a:rPr>
-              <a:t>Event URL </a:t>
-            </a:r>
-            <a:r>
-              <a:rPr lang="en-US" sz="2400" dirty="0">
-                <a:solidFill>
-                  <a:prstClr val="black"/>
-                </a:solidFill>
-                <a:latin typeface="Calibri"/>
-                <a:hlinkClick r:id="rId2"/>
-              </a:rPr>
-              <a:t>https://crowd.cc/spfdc17</a:t>
-            </a:r>
-            <a:r>
-              <a:rPr lang="en-US" sz="2400" dirty="0">
-                <a:solidFill>
-                  <a:prstClr val="black"/>
-                </a:solidFill>
-                <a:latin typeface="Calibri"/>
-              </a:rPr>
-              <a:t> </a:t>
-            </a:r>
-          </a:p>
-          <a:p>
-            <a:pPr lvl="1" defTabSz="914400"/>
-            <a:r>
-              <a:rPr lang="en-US" sz="2400" dirty="0">
-                <a:solidFill>
-                  <a:prstClr val="black"/>
-                </a:solidFill>
-                <a:latin typeface="Calibri"/>
-              </a:rPr>
-              <a:t>Your App URL </a:t>
-            </a:r>
-            <a:r>
-              <a:rPr lang="en-US" sz="2400" dirty="0">
-                <a:solidFill>
-                  <a:prstClr val="black"/>
-                </a:solidFill>
-                <a:latin typeface="Calibri"/>
-                <a:hlinkClick r:id="rId3"/>
-              </a:rPr>
-              <a:t>https://crowd.cc/s/zN7K</a:t>
-            </a:r>
-            <a:r>
-              <a:rPr lang="en-US" sz="2400" dirty="0">
-                <a:solidFill>
-                  <a:prstClr val="black"/>
-                </a:solidFill>
-                <a:latin typeface="Calibri"/>
-              </a:rPr>
-              <a:t>  </a:t>
-            </a:r>
-          </a:p>
-          <a:p>
-            <a:pPr lvl="1" defTabSz="914400"/>
-            <a:r>
-              <a:rPr lang="en-US" sz="2400" dirty="0">
-                <a:solidFill>
-                  <a:prstClr val="black"/>
-                </a:solidFill>
-                <a:latin typeface="Calibri"/>
-              </a:rPr>
-              <a:t>Or search for “SharePoint Fest” in                           App Store</a:t>
-            </a:r>
-          </a:p>
-          <a:p>
-            <a:pPr defTabSz="914400"/>
-            <a:endParaRPr lang="en-US" sz="1200" kern="3000" spc="30" dirty="0">
-              <a:solidFill>
-                <a:prstClr val="black">
-                  <a:lumMod val="75000"/>
-                  <a:lumOff val="25000"/>
-                </a:prstClr>
-              </a:solidFill>
-              <a:latin typeface="Calibri"/>
-            </a:endParaRPr>
-          </a:p>
-        </p:txBody>
-      </p:sp>
-      <p:pic>
-        <p:nvPicPr>
-          <p:cNvPr id="32" name="Picture 31"/>
-          <p:cNvPicPr>
-            <a:picLocks noChangeAspect="1"/>
-          </p:cNvPicPr>
-          <p:nvPr/>
-        </p:nvPicPr>
-        <p:blipFill>
-          <a:blip r:embed="rId4" cstate="print">
-            <a:extLst>
-              <a:ext uri="{28A0092B-C50C-407E-A947-70E740481C1C}">
-                <a14:useLocalDpi xmlns:a14="http://schemas.microsoft.com/office/drawing/2010/main" val="0"/>
-              </a:ext>
-            </a:extLst>
-          </a:blip>
-          <a:stretch>
-            <a:fillRect/>
-          </a:stretch>
-        </p:blipFill>
-        <p:spPr>
-          <a:xfrm>
-            <a:off x="9908758" y="6292556"/>
-            <a:ext cx="460860" cy="507495"/>
-          </a:xfrm>
-          <a:prstGeom prst="rect">
-            <a:avLst/>
-          </a:prstGeom>
-        </p:spPr>
-      </p:pic>
-      <p:pic>
-        <p:nvPicPr>
-          <p:cNvPr id="33" name="Picture 32"/>
-          <p:cNvPicPr>
-            <a:picLocks noChangeAspect="1"/>
-          </p:cNvPicPr>
-          <p:nvPr/>
-        </p:nvPicPr>
-        <p:blipFill>
-          <a:blip r:embed="rId4" cstate="print">
-            <a:extLst>
-              <a:ext uri="{28A0092B-C50C-407E-A947-70E740481C1C}">
-                <a14:useLocalDpi xmlns:a14="http://schemas.microsoft.com/office/drawing/2010/main" val="0"/>
-              </a:ext>
-            </a:extLst>
-          </a:blip>
-          <a:stretch>
-            <a:fillRect/>
-          </a:stretch>
-        </p:blipFill>
-        <p:spPr>
-          <a:xfrm>
-            <a:off x="3753295" y="143172"/>
-            <a:ext cx="460860" cy="507495"/>
-          </a:xfrm>
-          <a:prstGeom prst="rect">
-            <a:avLst/>
-          </a:prstGeom>
-        </p:spPr>
-      </p:pic>
-      <p:sp>
-        <p:nvSpPr>
-          <p:cNvPr id="34" name="TextBox 33"/>
-          <p:cNvSpPr txBox="1"/>
-          <p:nvPr/>
-        </p:nvSpPr>
-        <p:spPr>
-          <a:xfrm>
-            <a:off x="4252560" y="202980"/>
-            <a:ext cx="4608600" cy="369332"/>
-          </a:xfrm>
-          <a:prstGeom prst="rect">
-            <a:avLst/>
-          </a:prstGeom>
-          <a:noFill/>
-        </p:spPr>
-        <p:txBody>
-          <a:bodyPr wrap="square" rtlCol="0">
-            <a:spAutoFit/>
-          </a:bodyPr>
-          <a:lstStyle/>
-          <a:p>
-            <a:pPr defTabSz="914400"/>
-            <a:r>
-              <a:rPr lang="en-US" i="1" kern="3000" spc="30" dirty="0">
-                <a:solidFill>
-                  <a:prstClr val="black">
-                    <a:lumMod val="75000"/>
-                    <a:lumOff val="25000"/>
-                  </a:prstClr>
-                </a:solidFill>
-                <a:latin typeface="Cambria" pitchFamily="18" charset="0"/>
-              </a:rPr>
-              <a:t>Learn from the Top SharePoint Experts</a:t>
-            </a:r>
-          </a:p>
-        </p:txBody>
-      </p:sp>
-      <p:sp>
-        <p:nvSpPr>
-          <p:cNvPr id="35" name="TextBox 34"/>
-          <p:cNvSpPr txBox="1"/>
-          <p:nvPr/>
-        </p:nvSpPr>
-        <p:spPr>
-          <a:xfrm>
-            <a:off x="1488070" y="6249161"/>
-            <a:ext cx="1729961" cy="369332"/>
-          </a:xfrm>
-          <a:prstGeom prst="rect">
-            <a:avLst/>
-          </a:prstGeom>
-          <a:noFill/>
-          <a:effectLst>
-            <a:outerShdw blurRad="50800" dist="38100" dir="5400000" algn="t" rotWithShape="0">
-              <a:prstClr val="black">
-                <a:alpha val="40000"/>
-              </a:prstClr>
-            </a:outerShdw>
-          </a:effectLst>
-        </p:spPr>
-        <p:txBody>
-          <a:bodyPr wrap="none" rtlCol="0">
-            <a:spAutoFit/>
-          </a:bodyPr>
-          <a:lstStyle/>
-          <a:p>
-            <a:pPr defTabSz="914400"/>
-            <a:r>
-              <a:rPr lang="en-US" kern="3000" spc="30" dirty="0">
-                <a:solidFill>
-                  <a:prstClr val="white">
-                    <a:lumMod val="95000"/>
-                  </a:prstClr>
-                </a:solidFill>
-                <a:latin typeface="Myriad Pro Light" panose="020B0603030403020204" pitchFamily="34" charset="0"/>
-              </a:rPr>
-              <a:t>SharePoint Fest</a:t>
-            </a:r>
-          </a:p>
-        </p:txBody>
-      </p:sp>
-      <p:sp>
-        <p:nvSpPr>
-          <p:cNvPr id="36" name="TextBox 35"/>
-          <p:cNvSpPr txBox="1"/>
-          <p:nvPr/>
-        </p:nvSpPr>
-        <p:spPr>
-          <a:xfrm>
-            <a:off x="1977353" y="6499638"/>
-            <a:ext cx="841577" cy="307777"/>
-          </a:xfrm>
-          <a:prstGeom prst="rect">
-            <a:avLst/>
-          </a:prstGeom>
-          <a:noFill/>
-          <a:effectLst>
-            <a:outerShdw blurRad="50800" dist="38100" dir="5400000" algn="t" rotWithShape="0">
-              <a:prstClr val="black">
-                <a:alpha val="40000"/>
-              </a:prstClr>
-            </a:outerShdw>
-          </a:effectLst>
-        </p:spPr>
-        <p:txBody>
-          <a:bodyPr wrap="none" rtlCol="0">
-            <a:spAutoFit/>
-          </a:bodyPr>
-          <a:lstStyle/>
-          <a:p>
-            <a:pPr defTabSz="914400"/>
-            <a:r>
-              <a:rPr lang="en-US" sz="1400" i="1" kern="3000" spc="30" dirty="0">
-                <a:solidFill>
-                  <a:prstClr val="white">
-                    <a:lumMod val="95000"/>
-                  </a:prstClr>
-                </a:solidFill>
-                <a:latin typeface="Cambria" pitchFamily="18" charset="0"/>
-              </a:rPr>
-              <a:t>DC 2017</a:t>
-            </a:r>
-          </a:p>
-        </p:txBody>
-      </p:sp>
-      <p:sp>
-        <p:nvSpPr>
-          <p:cNvPr id="37" name="Footer Placeholder 15"/>
-          <p:cNvSpPr>
-            <a:spLocks noGrp="1"/>
-          </p:cNvSpPr>
-          <p:nvPr>
-            <p:ph type="ftr" sz="quarter" idx="11"/>
-          </p:nvPr>
-        </p:nvSpPr>
-        <p:spPr>
-          <a:xfrm>
-            <a:off x="3352166" y="6379134"/>
-            <a:ext cx="2052544" cy="286926"/>
-          </a:xfrm>
-        </p:spPr>
-        <p:txBody>
-          <a:bodyPr anchor="t"/>
-          <a:lstStyle/>
-          <a:p>
-            <a:pPr algn="l" defTabSz="914400"/>
-            <a:r>
-              <a:rPr lang="en-US" sz="1000" kern="3000" spc="30" dirty="0">
-                <a:solidFill>
-                  <a:prstClr val="white"/>
-                </a:solidFill>
-                <a:effectLst>
-                  <a:outerShdw blurRad="50800" dist="38100" dir="5400000" algn="t" rotWithShape="0">
-                    <a:prstClr val="black">
-                      <a:alpha val="40000"/>
-                    </a:prstClr>
-                  </a:outerShdw>
-                </a:effectLst>
-                <a:latin typeface="Calibri"/>
-              </a:rPr>
-              <a:t>WWW.SHAREPOINTFEST.COM  </a:t>
-            </a:r>
-            <a:endParaRPr lang="en-US" sz="1000" dirty="0">
-              <a:solidFill>
-                <a:prstClr val="black">
-                  <a:tint val="75000"/>
-                </a:prstClr>
-              </a:solidFill>
-              <a:effectLst>
-                <a:outerShdw blurRad="50800" dist="38100" dir="5400000" algn="t" rotWithShape="0">
-                  <a:prstClr val="black">
-                    <a:alpha val="40000"/>
-                  </a:prstClr>
-                </a:outerShdw>
-              </a:effectLst>
-              <a:latin typeface="Calibri"/>
-            </a:endParaRPr>
-          </a:p>
-        </p:txBody>
-      </p:sp>
-      <p:grpSp>
-        <p:nvGrpSpPr>
-          <p:cNvPr id="6" name="Group 5"/>
-          <p:cNvGrpSpPr/>
-          <p:nvPr/>
-        </p:nvGrpSpPr>
-        <p:grpSpPr>
-          <a:xfrm>
-            <a:off x="7701148" y="1776665"/>
-            <a:ext cx="2199274" cy="4285648"/>
-            <a:chOff x="6177148" y="1776665"/>
-            <a:chExt cx="2199274" cy="4285648"/>
-          </a:xfrm>
-        </p:grpSpPr>
-        <p:pic>
-          <p:nvPicPr>
-            <p:cNvPr id="18" name="Picture 17"/>
-            <p:cNvPicPr>
-              <a:picLocks noChangeAspect="1"/>
-            </p:cNvPicPr>
-            <p:nvPr/>
-          </p:nvPicPr>
-          <p:blipFill>
-            <a:blip r:embed="rId5"/>
-            <a:stretch>
-              <a:fillRect/>
-            </a:stretch>
-          </p:blipFill>
-          <p:spPr>
-            <a:xfrm>
-              <a:off x="6177148" y="1776665"/>
-              <a:ext cx="2199274" cy="4285648"/>
-            </a:xfrm>
-            <a:prstGeom prst="rect">
-              <a:avLst/>
-            </a:prstGeom>
-          </p:spPr>
-        </p:pic>
-        <p:pic>
-          <p:nvPicPr>
-            <p:cNvPr id="4" name="Picture 3"/>
-            <p:cNvPicPr>
-              <a:picLocks noChangeAspect="1"/>
-            </p:cNvPicPr>
-            <p:nvPr/>
-          </p:nvPicPr>
-          <p:blipFill rotWithShape="1">
-            <a:blip r:embed="rId6" cstate="print">
-              <a:extLst>
-                <a:ext uri="{28A0092B-C50C-407E-A947-70E740481C1C}">
-                  <a14:useLocalDpi xmlns:a14="http://schemas.microsoft.com/office/drawing/2010/main" val="0"/>
-                </a:ext>
-              </a:extLst>
-            </a:blip>
-            <a:srcRect l="2854" t="1790" b="2432"/>
-            <a:stretch/>
-          </p:blipFill>
-          <p:spPr>
-            <a:xfrm>
-              <a:off x="6377035" y="2315255"/>
-              <a:ext cx="1774825" cy="3110805"/>
-            </a:xfrm>
-            <a:prstGeom prst="rect">
-              <a:avLst/>
-            </a:prstGeom>
-          </p:spPr>
-        </p:pic>
-      </p:grpSp>
-    </p:spTree>
-    <p:extLst>
-      <p:ext uri="{BB962C8B-B14F-4D97-AF65-F5344CB8AC3E}">
-        <p14:creationId xmlns:p14="http://schemas.microsoft.com/office/powerpoint/2010/main" val="1543840912"/>
-      </p:ext>
-    </p:extLst>
-  </p:cSld>
-  <p:clrMapOvr>
-    <a:masterClrMapping/>
-  </p:clrMapOvr>
-  <mc:AlternateContent xmlns:mc="http://schemas.openxmlformats.org/markup-compatibility/2006" xmlns:p14="http://schemas.microsoft.com/office/powerpoint/2010/main">
-    <mc:Choice Requires="p14">
-      <p:transition spd="med" p14:dur="700">
-        <p:fade/>
-      </p:transition>
-    </mc:Choice>
-    <mc:Fallback xmlns="">
-      <p:transition spd="med">
-        <p:fade/>
-      </p:transition>
-    </mc:Fallback>
-  </mc:AlternateContent>
 </p:sld>
 </file>
 
@@ -9497,7 +8951,13 @@
       </p:grpSpPr>
       <p:sp>
         <p:nvSpPr>
-          <p:cNvPr id="2" name="Title 1"/>
+          <p:cNvPr id="2" name="Title 1">
+            <a:extLst>
+              <a:ext uri="{FF2B5EF4-FFF2-40B4-BE49-F238E27FC236}">
+                <a16:creationId xmlns:a16="http://schemas.microsoft.com/office/drawing/2014/main" id="{7F1BB53E-F45F-4F39-9A85-19E55DB5425B}"/>
+              </a:ext>
+            </a:extLst>
+          </p:cNvPr>
           <p:cNvSpPr>
             <a:spLocks noGrp="1"/>
           </p:cNvSpPr>
@@ -9511,19 +8971,21 @@
           <a:lstStyle/>
           <a:p>
             <a:r>
-              <a:rPr lang="en-US" dirty="0" err="1"/>
-              <a:t>REACt</a:t>
-            </a:r>
-            <a:r>
-              <a:rPr lang="en-US" dirty="0"/>
-              <a:t> key Components</a:t>
-            </a:r>
-          </a:p>
-        </p:txBody>
-      </p:sp>
-      <p:sp>
-        <p:nvSpPr>
-          <p:cNvPr id="3" name="Content Placeholder 2"/>
+              <a:rPr lang="en-US" dirty="0"/>
+              <a:t>Who this is for</a:t>
+            </a:r>
+          </a:p>
+        </p:txBody>
+      </p:sp>
+      <p:sp>
+        <p:nvSpPr>
+          <p:cNvPr id="3" name="Content Placeholder 2">
+            <a:extLst>
+              <a:ext uri="{FF2B5EF4-FFF2-40B4-BE49-F238E27FC236}">
+                <a16:creationId xmlns:a16="http://schemas.microsoft.com/office/drawing/2014/main" id="{B1A4BDF5-DC96-4C65-BD1F-734E6B49837E}"/>
+              </a:ext>
+            </a:extLst>
+          </p:cNvPr>
           <p:cNvSpPr>
             <a:spLocks noGrp="1"/>
           </p:cNvSpPr>
@@ -9536,142 +8998,21 @@
           <a:bodyPr/>
           <a:lstStyle/>
           <a:p>
-            <a:endParaRPr lang="en-US" dirty="0"/>
-          </a:p>
-        </p:txBody>
-      </p:sp>
-      <p:sp>
-        <p:nvSpPr>
-          <p:cNvPr id="5" name="Rectangle: Rounded Corners 4"/>
-          <p:cNvSpPr/>
-          <p:nvPr/>
-        </p:nvSpPr>
-        <p:spPr>
-          <a:xfrm>
-            <a:off x="789039" y="3075039"/>
-            <a:ext cx="3318387" cy="1460090"/>
-          </a:xfrm>
-          <a:prstGeom prst="roundRect">
-            <a:avLst/>
-          </a:prstGeom>
-        </p:spPr>
-        <p:style>
-          <a:lnRef idx="2">
-            <a:schemeClr val="accent1">
-              <a:shade val="50000"/>
-            </a:schemeClr>
-          </a:lnRef>
-          <a:fillRef idx="1">
-            <a:schemeClr val="accent1"/>
-          </a:fillRef>
-          <a:effectRef idx="0">
-            <a:schemeClr val="accent1"/>
-          </a:effectRef>
-          <a:fontRef idx="minor">
-            <a:schemeClr val="lt1"/>
-          </a:fontRef>
-        </p:style>
-        <p:txBody>
-          <a:bodyPr rtlCol="0" anchor="ctr"/>
-          <a:lstStyle/>
-          <a:p>
-            <a:pPr algn="ctr"/>
-            <a:r>
-              <a:rPr lang="en-US" sz="3600" dirty="0"/>
-              <a:t>Build Components</a:t>
-            </a:r>
-          </a:p>
-        </p:txBody>
-      </p:sp>
-      <p:sp>
-        <p:nvSpPr>
-          <p:cNvPr id="6" name="Rectangle: Rounded Corners 5"/>
-          <p:cNvSpPr/>
-          <p:nvPr/>
-        </p:nvSpPr>
-        <p:spPr>
-          <a:xfrm>
-            <a:off x="4318819" y="3075039"/>
-            <a:ext cx="3318387" cy="1460090"/>
-          </a:xfrm>
-          <a:prstGeom prst="roundRect">
-            <a:avLst/>
-          </a:prstGeom>
-        </p:spPr>
-        <p:style>
-          <a:lnRef idx="2">
-            <a:schemeClr val="accent1">
-              <a:shade val="50000"/>
-            </a:schemeClr>
-          </a:lnRef>
-          <a:fillRef idx="1">
-            <a:schemeClr val="accent1"/>
-          </a:fillRef>
-          <a:effectRef idx="0">
-            <a:schemeClr val="accent1"/>
-          </a:effectRef>
-          <a:fontRef idx="minor">
-            <a:schemeClr val="lt1"/>
-          </a:fontRef>
-        </p:style>
-        <p:txBody>
-          <a:bodyPr rtlCol="0" anchor="ctr"/>
-          <a:lstStyle/>
-          <a:p>
-            <a:pPr algn="ctr"/>
-            <a:r>
-              <a:rPr lang="en-US" sz="3600" dirty="0"/>
-              <a:t>Re-Render, Don’t Mutate</a:t>
-            </a:r>
-          </a:p>
-        </p:txBody>
-      </p:sp>
-      <p:sp>
-        <p:nvSpPr>
-          <p:cNvPr id="7" name="Rectangle: Rounded Corners 6"/>
-          <p:cNvSpPr/>
-          <p:nvPr/>
-        </p:nvSpPr>
-        <p:spPr>
-          <a:xfrm>
-            <a:off x="7848599" y="3075039"/>
-            <a:ext cx="3318387" cy="1460090"/>
-          </a:xfrm>
-          <a:prstGeom prst="roundRect">
-            <a:avLst/>
-          </a:prstGeom>
-        </p:spPr>
-        <p:style>
-          <a:lnRef idx="2">
-            <a:schemeClr val="accent1">
-              <a:shade val="50000"/>
-            </a:schemeClr>
-          </a:lnRef>
-          <a:fillRef idx="1">
-            <a:schemeClr val="accent1"/>
-          </a:fillRef>
-          <a:effectRef idx="0">
-            <a:schemeClr val="accent1"/>
-          </a:effectRef>
-          <a:fontRef idx="minor">
-            <a:schemeClr val="lt1"/>
-          </a:fontRef>
-        </p:style>
-        <p:txBody>
-          <a:bodyPr rtlCol="0" anchor="ctr"/>
-          <a:lstStyle/>
-          <a:p>
-            <a:pPr algn="ctr"/>
-            <a:r>
-              <a:rPr lang="en-US" sz="3600" dirty="0"/>
-              <a:t>Fast Virtual</a:t>
-            </a:r>
-          </a:p>
-          <a:p>
-            <a:pPr algn="ctr"/>
-            <a:r>
-              <a:rPr lang="en-US" sz="3600" dirty="0"/>
-              <a:t>DOM</a:t>
+            <a:r>
+              <a:rPr lang="en-US" dirty="0"/>
+              <a:t>Developer that is familiar with SharePoint</a:t>
+            </a:r>
+          </a:p>
+          <a:p>
+            <a:r>
+              <a:rPr lang="en-US" dirty="0"/>
+              <a:t>Familiar with JavaScript</a:t>
+            </a:r>
+          </a:p>
+          <a:p>
+            <a:r>
+              <a:rPr lang="en-US" dirty="0"/>
+              <a:t>Interested in React JS</a:t>
             </a:r>
           </a:p>
         </p:txBody>
@@ -9679,7 +9020,7 @@
     </p:spTree>
     <p:extLst>
       <p:ext uri="{BB962C8B-B14F-4D97-AF65-F5344CB8AC3E}">
-        <p14:creationId xmlns:p14="http://schemas.microsoft.com/office/powerpoint/2010/main" val="274571820"/>
+        <p14:creationId xmlns:p14="http://schemas.microsoft.com/office/powerpoint/2010/main" val="224995662"/>
       </p:ext>
     </p:extLst>
   </p:cSld>
@@ -9706,6 +9047,962 @@
           <a:chExt cx="0" cy="0"/>
         </a:xfrm>
       </p:grpSpPr>
+      <p:grpSp>
+        <p:nvGrpSpPr>
+          <p:cNvPr id="24" name="Group 23"/>
+          <p:cNvGrpSpPr/>
+          <p:nvPr/>
+        </p:nvGrpSpPr>
+        <p:grpSpPr>
+          <a:xfrm>
+            <a:off x="6451697" y="2012837"/>
+            <a:ext cx="3694217" cy="3773472"/>
+            <a:chOff x="471790" y="2591449"/>
+            <a:chExt cx="3768294" cy="3849138"/>
+          </a:xfrm>
+        </p:grpSpPr>
+        <p:sp>
+          <p:nvSpPr>
+            <p:cNvPr id="4" name="Rectangle 3"/>
+            <p:cNvSpPr/>
+            <p:nvPr/>
+          </p:nvSpPr>
+          <p:spPr bwMode="auto">
+            <a:xfrm>
+              <a:off x="471790" y="2593239"/>
+              <a:ext cx="3762803" cy="2590800"/>
+            </a:xfrm>
+            <a:prstGeom prst="rect">
+              <a:avLst/>
+            </a:prstGeom>
+            <a:ln w="38100">
+              <a:noFill/>
+              <a:headEnd type="none" w="med" len="med"/>
+              <a:tailEnd type="none" w="med" len="med"/>
+            </a:ln>
+          </p:spPr>
+          <p:style>
+            <a:lnRef idx="2">
+              <a:schemeClr val="accent1"/>
+            </a:lnRef>
+            <a:fillRef idx="1">
+              <a:schemeClr val="lt1"/>
+            </a:fillRef>
+            <a:effectRef idx="0">
+              <a:schemeClr val="accent1"/>
+            </a:effectRef>
+            <a:fontRef idx="minor">
+              <a:schemeClr val="dk1"/>
+            </a:fontRef>
+          </p:style>
+          <p:txBody>
+            <a:bodyPr vert="horz" wrap="square" lIns="179285" tIns="89642" rIns="179285" bIns="45720" numCol="1" rtlCol="0" anchor="t" anchorCtr="0" compatLnSpc="1">
+              <a:prstTxWarp prst="textNoShape">
+                <a:avLst/>
+              </a:prstTxWarp>
+            </a:bodyPr>
+            <a:lstStyle/>
+            <a:p>
+              <a:pPr defTabSz="914102" fontAlgn="base">
+                <a:spcBef>
+                  <a:spcPct val="0"/>
+                </a:spcBef>
+                <a:spcAft>
+                  <a:spcPct val="0"/>
+                </a:spcAft>
+                <a:defRPr/>
+              </a:pPr>
+              <a:endParaRPr lang="en-US" sz="1961" kern="0" dirty="0">
+                <a:solidFill>
+                  <a:schemeClr val="tx1">
+                    <a:lumMod val="40000"/>
+                    <a:lumOff val="60000"/>
+                  </a:schemeClr>
+                </a:solidFill>
+              </a:endParaRPr>
+            </a:p>
+          </p:txBody>
+        </p:sp>
+        <p:sp>
+          <p:nvSpPr>
+            <p:cNvPr id="5" name="TextBox 4"/>
+            <p:cNvSpPr txBox="1"/>
+            <p:nvPr/>
+          </p:nvSpPr>
+          <p:spPr>
+            <a:xfrm>
+              <a:off x="852790" y="3277417"/>
+              <a:ext cx="3387294" cy="1923604"/>
+            </a:xfrm>
+            <a:prstGeom prst="rect">
+              <a:avLst/>
+            </a:prstGeom>
+            <a:noFill/>
+          </p:spPr>
+          <p:txBody>
+            <a:bodyPr wrap="square" lIns="179285" tIns="143428" rIns="179285" bIns="143428" rtlCol="0">
+              <a:spAutoFit/>
+            </a:bodyPr>
+            <a:lstStyle/>
+            <a:p>
+              <a:pPr defTabSz="896386">
+                <a:lnSpc>
+                  <a:spcPct val="90000"/>
+                </a:lnSpc>
+                <a:spcAft>
+                  <a:spcPts val="588"/>
+                </a:spcAft>
+                <a:defRPr/>
+              </a:pPr>
+              <a:r>
+                <a:rPr lang="en-US" sz="1568" kern="0" dirty="0">
+                  <a:gradFill>
+                    <a:gsLst>
+                      <a:gs pos="2917">
+                        <a:schemeClr val="tx1"/>
+                      </a:gs>
+                      <a:gs pos="30000">
+                        <a:schemeClr val="tx1"/>
+                      </a:gs>
+                    </a:gsLst>
+                    <a:lin ang="5400000" scaled="0"/>
+                  </a:gradFill>
+                </a:rPr>
+                <a:t>Visual Studio Code</a:t>
+              </a:r>
+              <a:br>
+                <a:rPr lang="en-US" sz="1568" kern="0" dirty="0">
+                  <a:gradFill>
+                    <a:gsLst>
+                      <a:gs pos="2917">
+                        <a:schemeClr val="tx1"/>
+                      </a:gs>
+                      <a:gs pos="30000">
+                        <a:schemeClr val="tx1"/>
+                      </a:gs>
+                    </a:gsLst>
+                    <a:lin ang="5400000" scaled="0"/>
+                  </a:gradFill>
+                </a:rPr>
+              </a:br>
+              <a:br>
+                <a:rPr lang="en-US" sz="1568" kern="0" dirty="0">
+                  <a:gradFill>
+                    <a:gsLst>
+                      <a:gs pos="2917">
+                        <a:schemeClr val="tx1"/>
+                      </a:gs>
+                      <a:gs pos="30000">
+                        <a:schemeClr val="tx1"/>
+                      </a:gs>
+                    </a:gsLst>
+                    <a:lin ang="5400000" scaled="0"/>
+                  </a:gradFill>
+                </a:rPr>
+              </a:br>
+              <a:r>
+                <a:rPr lang="en-US" sz="1568" kern="0" dirty="0">
+                  <a:gradFill>
+                    <a:gsLst>
+                      <a:gs pos="2917">
+                        <a:schemeClr val="tx1"/>
+                      </a:gs>
+                      <a:gs pos="30000">
+                        <a:schemeClr val="tx1"/>
+                      </a:gs>
+                    </a:gsLst>
+                    <a:lin ang="5400000" scaled="0"/>
+                  </a:gradFill>
+                </a:rPr>
+                <a:t>Atom</a:t>
+              </a:r>
+              <a:br>
+                <a:rPr lang="en-US" sz="1568" kern="0" dirty="0">
+                  <a:gradFill>
+                    <a:gsLst>
+                      <a:gs pos="2917">
+                        <a:schemeClr val="tx1"/>
+                      </a:gs>
+                      <a:gs pos="30000">
+                        <a:schemeClr val="tx1"/>
+                      </a:gs>
+                    </a:gsLst>
+                    <a:lin ang="5400000" scaled="0"/>
+                  </a:gradFill>
+                </a:rPr>
+              </a:br>
+              <a:br>
+                <a:rPr lang="en-US" sz="1568" kern="0" dirty="0">
+                  <a:gradFill>
+                    <a:gsLst>
+                      <a:gs pos="2917">
+                        <a:schemeClr val="tx1"/>
+                      </a:gs>
+                      <a:gs pos="30000">
+                        <a:schemeClr val="tx1"/>
+                      </a:gs>
+                    </a:gsLst>
+                    <a:lin ang="5400000" scaled="0"/>
+                  </a:gradFill>
+                </a:rPr>
+              </a:br>
+              <a:r>
+                <a:rPr lang="en-US" sz="1568" kern="0" dirty="0">
+                  <a:gradFill>
+                    <a:gsLst>
+                      <a:gs pos="2917">
+                        <a:schemeClr val="tx1"/>
+                      </a:gs>
+                      <a:gs pos="30000">
+                        <a:schemeClr val="tx1"/>
+                      </a:gs>
+                    </a:gsLst>
+                    <a:lin ang="5400000" scaled="0"/>
+                  </a:gradFill>
+                </a:rPr>
+                <a:t>Sublime</a:t>
+              </a:r>
+              <a:br>
+                <a:rPr lang="en-US" sz="1568" kern="0" dirty="0">
+                  <a:gradFill>
+                    <a:gsLst>
+                      <a:gs pos="2917">
+                        <a:schemeClr val="tx1"/>
+                      </a:gs>
+                      <a:gs pos="30000">
+                        <a:schemeClr val="tx1"/>
+                      </a:gs>
+                    </a:gsLst>
+                    <a:lin ang="5400000" scaled="0"/>
+                  </a:gradFill>
+                </a:rPr>
+              </a:br>
+              <a:endParaRPr lang="en-US" sz="1568" kern="0" dirty="0">
+                <a:gradFill>
+                  <a:gsLst>
+                    <a:gs pos="2917">
+                      <a:schemeClr val="tx1"/>
+                    </a:gs>
+                    <a:gs pos="30000">
+                      <a:schemeClr val="tx1"/>
+                    </a:gs>
+                  </a:gsLst>
+                  <a:lin ang="5400000" scaled="0"/>
+                </a:gradFill>
+              </a:endParaRPr>
+            </a:p>
+            <a:p>
+              <a:pPr defTabSz="896386">
+                <a:lnSpc>
+                  <a:spcPct val="90000"/>
+                </a:lnSpc>
+                <a:spcAft>
+                  <a:spcPts val="588"/>
+                </a:spcAft>
+                <a:defRPr/>
+              </a:pPr>
+              <a:r>
+                <a:rPr lang="en-US" sz="1568" b="1" kern="0" dirty="0">
+                  <a:gradFill>
+                    <a:gsLst>
+                      <a:gs pos="2917">
+                        <a:schemeClr val="tx1"/>
+                      </a:gs>
+                      <a:gs pos="30000">
+                        <a:schemeClr val="tx1"/>
+                      </a:gs>
+                    </a:gsLst>
+                    <a:lin ang="5400000" scaled="0"/>
+                  </a:gradFill>
+                </a:rPr>
+                <a:t>and more </a:t>
+              </a:r>
+              <a:r>
+                <a:rPr lang="is-IS" sz="1568" b="1" kern="0" dirty="0">
+                  <a:gradFill>
+                    <a:gsLst>
+                      <a:gs pos="2917">
+                        <a:schemeClr val="tx1"/>
+                      </a:gs>
+                      <a:gs pos="30000">
+                        <a:schemeClr val="tx1"/>
+                      </a:gs>
+                    </a:gsLst>
+                    <a:lin ang="5400000" scaled="0"/>
+                  </a:gradFill>
+                </a:rPr>
+                <a:t>… your choice!</a:t>
+              </a:r>
+              <a:endParaRPr lang="en-US" sz="1568" b="1" kern="0" dirty="0">
+                <a:gradFill>
+                  <a:gsLst>
+                    <a:gs pos="2917">
+                      <a:schemeClr val="tx1"/>
+                    </a:gs>
+                    <a:gs pos="30000">
+                      <a:schemeClr val="tx1"/>
+                    </a:gs>
+                  </a:gsLst>
+                  <a:lin ang="5400000" scaled="0"/>
+                </a:gradFill>
+              </a:endParaRPr>
+            </a:p>
+          </p:txBody>
+        </p:sp>
+        <p:sp>
+          <p:nvSpPr>
+            <p:cNvPr id="6" name="Rectangle 5"/>
+            <p:cNvSpPr/>
+            <p:nvPr/>
+          </p:nvSpPr>
+          <p:spPr bwMode="auto">
+            <a:xfrm>
+              <a:off x="471791" y="2591449"/>
+              <a:ext cx="3762802" cy="575828"/>
+            </a:xfrm>
+            <a:prstGeom prst="rect">
+              <a:avLst/>
+            </a:prstGeom>
+            <a:solidFill>
+              <a:srgbClr val="0078D7"/>
+            </a:solidFill>
+            <a:ln>
+              <a:noFill/>
+              <a:headEnd type="none" w="med" len="med"/>
+              <a:tailEnd type="none" w="med" len="med"/>
+            </a:ln>
+          </p:spPr>
+          <p:style>
+            <a:lnRef idx="2">
+              <a:schemeClr val="accent1">
+                <a:shade val="50000"/>
+              </a:schemeClr>
+            </a:lnRef>
+            <a:fillRef idx="1">
+              <a:schemeClr val="accent1"/>
+            </a:fillRef>
+            <a:effectRef idx="0">
+              <a:schemeClr val="accent1"/>
+            </a:effectRef>
+            <a:fontRef idx="minor">
+              <a:schemeClr val="lt1"/>
+            </a:fontRef>
+          </p:style>
+          <p:txBody>
+            <a:bodyPr vert="horz" wrap="square" lIns="448212" tIns="0" rIns="0" bIns="0" numCol="1" rtlCol="0" anchor="ctr" anchorCtr="0" compatLnSpc="1">
+              <a:prstTxWarp prst="textNoShape">
+                <a:avLst/>
+              </a:prstTxWarp>
+            </a:bodyPr>
+            <a:lstStyle/>
+            <a:p>
+              <a:pPr defTabSz="914102" fontAlgn="base">
+                <a:spcBef>
+                  <a:spcPct val="0"/>
+                </a:spcBef>
+                <a:spcAft>
+                  <a:spcPct val="0"/>
+                </a:spcAft>
+                <a:defRPr/>
+              </a:pPr>
+              <a:r>
+                <a:rPr lang="en-US" sz="1961" kern="0" dirty="0">
+                  <a:gradFill>
+                    <a:gsLst>
+                      <a:gs pos="5439">
+                        <a:srgbClr val="F8F8F8"/>
+                      </a:gs>
+                      <a:gs pos="10000">
+                        <a:srgbClr val="F8F8F8"/>
+                      </a:gs>
+                    </a:gsLst>
+                    <a:lin ang="5400000" scaled="0"/>
+                  </a:gradFill>
+                </a:rPr>
+                <a:t>  Code Editors</a:t>
+              </a:r>
+            </a:p>
+          </p:txBody>
+        </p:sp>
+        <p:pic>
+          <p:nvPicPr>
+            <p:cNvPr id="7" name="Picture 6"/>
+            <p:cNvPicPr>
+              <a:picLocks noChangeAspect="1"/>
+            </p:cNvPicPr>
+            <p:nvPr/>
+          </p:nvPicPr>
+          <p:blipFill>
+            <a:blip r:embed="rId2"/>
+            <a:stretch>
+              <a:fillRect/>
+            </a:stretch>
+          </p:blipFill>
+          <p:spPr>
+            <a:xfrm>
+              <a:off x="586090" y="2701589"/>
+              <a:ext cx="365760" cy="320040"/>
+            </a:xfrm>
+            <a:prstGeom prst="rect">
+              <a:avLst/>
+            </a:prstGeom>
+          </p:spPr>
+        </p:pic>
+        <p:pic>
+          <p:nvPicPr>
+            <p:cNvPr id="16" name="Picture 15"/>
+            <p:cNvPicPr>
+              <a:picLocks noChangeAspect="1"/>
+            </p:cNvPicPr>
+            <p:nvPr/>
+          </p:nvPicPr>
+          <p:blipFill>
+            <a:blip r:embed="rId3"/>
+            <a:stretch>
+              <a:fillRect/>
+            </a:stretch>
+          </p:blipFill>
+          <p:spPr>
+            <a:xfrm>
+              <a:off x="855578" y="6110984"/>
+              <a:ext cx="1563067" cy="329603"/>
+            </a:xfrm>
+            <a:prstGeom prst="rect">
+              <a:avLst/>
+            </a:prstGeom>
+          </p:spPr>
+        </p:pic>
+        <p:pic>
+          <p:nvPicPr>
+            <p:cNvPr id="17" name="Picture 16"/>
+            <p:cNvPicPr>
+              <a:picLocks noChangeAspect="1"/>
+            </p:cNvPicPr>
+            <p:nvPr/>
+          </p:nvPicPr>
+          <p:blipFill>
+            <a:blip r:embed="rId4"/>
+            <a:stretch>
+              <a:fillRect/>
+            </a:stretch>
+          </p:blipFill>
+          <p:spPr>
+            <a:xfrm>
+              <a:off x="855578" y="5438276"/>
+              <a:ext cx="1887594" cy="444139"/>
+            </a:xfrm>
+            <a:prstGeom prst="rect">
+              <a:avLst/>
+            </a:prstGeom>
+          </p:spPr>
+        </p:pic>
+        <p:pic>
+          <p:nvPicPr>
+            <p:cNvPr id="18" name="Picture 17"/>
+            <p:cNvPicPr>
+              <a:picLocks noChangeAspect="1"/>
+            </p:cNvPicPr>
+            <p:nvPr/>
+          </p:nvPicPr>
+          <p:blipFill>
+            <a:blip r:embed="rId5"/>
+            <a:stretch>
+              <a:fillRect/>
+            </a:stretch>
+          </p:blipFill>
+          <p:spPr>
+            <a:xfrm>
+              <a:off x="3058725" y="5585402"/>
+              <a:ext cx="753481" cy="753481"/>
+            </a:xfrm>
+            <a:prstGeom prst="rect">
+              <a:avLst/>
+            </a:prstGeom>
+          </p:spPr>
+        </p:pic>
+      </p:grpSp>
+      <p:grpSp>
+        <p:nvGrpSpPr>
+          <p:cNvPr id="34" name="Group 33"/>
+          <p:cNvGrpSpPr/>
+          <p:nvPr/>
+        </p:nvGrpSpPr>
+        <p:grpSpPr>
+          <a:xfrm>
+            <a:off x="1779623" y="2005843"/>
+            <a:ext cx="3901556" cy="3563092"/>
+            <a:chOff x="288993" y="2042384"/>
+            <a:chExt cx="3979791" cy="3634540"/>
+          </a:xfrm>
+        </p:grpSpPr>
+        <p:sp>
+          <p:nvSpPr>
+            <p:cNvPr id="11" name="Rectangle 10"/>
+            <p:cNvSpPr/>
+            <p:nvPr/>
+          </p:nvSpPr>
+          <p:spPr bwMode="auto">
+            <a:xfrm>
+              <a:off x="437497" y="2042384"/>
+              <a:ext cx="3831287" cy="2590800"/>
+            </a:xfrm>
+            <a:prstGeom prst="rect">
+              <a:avLst/>
+            </a:prstGeom>
+            <a:ln w="38100">
+              <a:noFill/>
+              <a:headEnd type="none" w="med" len="med"/>
+              <a:tailEnd type="none" w="med" len="med"/>
+            </a:ln>
+          </p:spPr>
+          <p:style>
+            <a:lnRef idx="2">
+              <a:schemeClr val="accent1"/>
+            </a:lnRef>
+            <a:fillRef idx="1">
+              <a:schemeClr val="lt1"/>
+            </a:fillRef>
+            <a:effectRef idx="0">
+              <a:schemeClr val="accent1"/>
+            </a:effectRef>
+            <a:fontRef idx="minor">
+              <a:schemeClr val="dk1"/>
+            </a:fontRef>
+          </p:style>
+          <p:txBody>
+            <a:bodyPr vert="horz" wrap="square" lIns="179285" tIns="89642" rIns="179285" bIns="45720" numCol="1" rtlCol="0" anchor="t" anchorCtr="0" compatLnSpc="1">
+              <a:prstTxWarp prst="textNoShape">
+                <a:avLst/>
+              </a:prstTxWarp>
+            </a:bodyPr>
+            <a:lstStyle/>
+            <a:p>
+              <a:pPr defTabSz="914102" fontAlgn="base">
+                <a:spcBef>
+                  <a:spcPct val="0"/>
+                </a:spcBef>
+                <a:spcAft>
+                  <a:spcPct val="0"/>
+                </a:spcAft>
+                <a:defRPr/>
+              </a:pPr>
+              <a:endParaRPr lang="en-US" sz="1961" kern="0" dirty="0">
+                <a:solidFill>
+                  <a:schemeClr val="tx1">
+                    <a:lumMod val="40000"/>
+                    <a:lumOff val="60000"/>
+                  </a:schemeClr>
+                </a:solidFill>
+              </a:endParaRPr>
+            </a:p>
+          </p:txBody>
+        </p:sp>
+        <p:sp>
+          <p:nvSpPr>
+            <p:cNvPr id="12" name="TextBox 11"/>
+            <p:cNvSpPr txBox="1"/>
+            <p:nvPr/>
+          </p:nvSpPr>
+          <p:spPr>
+            <a:xfrm>
+              <a:off x="791811" y="2735486"/>
+              <a:ext cx="2867373" cy="1846174"/>
+            </a:xfrm>
+            <a:prstGeom prst="rect">
+              <a:avLst/>
+            </a:prstGeom>
+            <a:noFill/>
+          </p:spPr>
+          <p:txBody>
+            <a:bodyPr wrap="square" lIns="179285" tIns="143428" rIns="179285" bIns="143428" rtlCol="0">
+              <a:spAutoFit/>
+            </a:bodyPr>
+            <a:lstStyle/>
+            <a:p>
+              <a:pPr defTabSz="896386">
+                <a:lnSpc>
+                  <a:spcPct val="90000"/>
+                </a:lnSpc>
+                <a:spcAft>
+                  <a:spcPts val="588"/>
+                </a:spcAft>
+                <a:defRPr/>
+              </a:pPr>
+              <a:r>
+                <a:rPr lang="en-US" sz="1568" kern="0" dirty="0">
+                  <a:gradFill>
+                    <a:gsLst>
+                      <a:gs pos="2917">
+                        <a:schemeClr val="tx1"/>
+                      </a:gs>
+                      <a:gs pos="30000">
+                        <a:schemeClr val="tx1"/>
+                      </a:gs>
+                    </a:gsLst>
+                    <a:lin ang="5400000" scaled="0"/>
+                  </a:gradFill>
+                </a:rPr>
+                <a:t>Gulp-based Build Process</a:t>
+              </a:r>
+              <a:br>
+                <a:rPr lang="en-US" sz="1568" kern="0" dirty="0">
+                  <a:gradFill>
+                    <a:gsLst>
+                      <a:gs pos="2917">
+                        <a:schemeClr val="tx1"/>
+                      </a:gs>
+                      <a:gs pos="30000">
+                        <a:schemeClr val="tx1"/>
+                      </a:gs>
+                    </a:gsLst>
+                    <a:lin ang="5400000" scaled="0"/>
+                  </a:gradFill>
+                </a:rPr>
+              </a:br>
+              <a:r>
+                <a:rPr lang="en-US" sz="1568" kern="0" dirty="0">
+                  <a:gradFill>
+                    <a:gsLst>
+                      <a:gs pos="2917">
+                        <a:schemeClr val="tx1"/>
+                      </a:gs>
+                      <a:gs pos="30000">
+                        <a:schemeClr val="tx1"/>
+                      </a:gs>
+                    </a:gsLst>
+                    <a:lin ang="5400000" scaled="0"/>
+                  </a:gradFill>
+                </a:rPr>
+                <a:t>NodeJS/NPM</a:t>
+              </a:r>
+              <a:br>
+                <a:rPr lang="en-US" sz="1568" kern="0" dirty="0">
+                  <a:gradFill>
+                    <a:gsLst>
+                      <a:gs pos="2917">
+                        <a:schemeClr val="tx1"/>
+                      </a:gs>
+                      <a:gs pos="30000">
+                        <a:schemeClr val="tx1"/>
+                      </a:gs>
+                    </a:gsLst>
+                    <a:lin ang="5400000" scaled="0"/>
+                  </a:gradFill>
+                </a:rPr>
+              </a:br>
+              <a:r>
+                <a:rPr lang="en-US" sz="1568" kern="0" dirty="0" err="1">
+                  <a:gradFill>
+                    <a:gsLst>
+                      <a:gs pos="2917">
+                        <a:schemeClr val="tx1"/>
+                      </a:gs>
+                      <a:gs pos="30000">
+                        <a:schemeClr val="tx1"/>
+                      </a:gs>
+                    </a:gsLst>
+                    <a:lin ang="5400000" scaled="0"/>
+                  </a:gradFill>
+                </a:rPr>
+                <a:t>SystemJS</a:t>
+              </a:r>
+              <a:br>
+                <a:rPr lang="en-US" sz="1568" kern="0" dirty="0">
+                  <a:gradFill>
+                    <a:gsLst>
+                      <a:gs pos="2917">
+                        <a:schemeClr val="tx1"/>
+                      </a:gs>
+                      <a:gs pos="30000">
+                        <a:schemeClr val="tx1"/>
+                      </a:gs>
+                    </a:gsLst>
+                    <a:lin ang="5400000" scaled="0"/>
+                  </a:gradFill>
+                </a:rPr>
+              </a:br>
+              <a:r>
+                <a:rPr lang="en-US" sz="1568" kern="0" dirty="0" err="1">
+                  <a:gradFill>
+                    <a:gsLst>
+                      <a:gs pos="2917">
+                        <a:schemeClr val="tx1"/>
+                      </a:gs>
+                      <a:gs pos="30000">
+                        <a:schemeClr val="tx1"/>
+                      </a:gs>
+                    </a:gsLst>
+                    <a:lin ang="5400000" scaled="0"/>
+                  </a:gradFill>
+                </a:rPr>
+                <a:t>Webpack</a:t>
+              </a:r>
+              <a:br>
+                <a:rPr lang="en-US" sz="1568" kern="0" dirty="0">
+                  <a:gradFill>
+                    <a:gsLst>
+                      <a:gs pos="2917">
+                        <a:schemeClr val="tx1"/>
+                      </a:gs>
+                      <a:gs pos="30000">
+                        <a:schemeClr val="tx1"/>
+                      </a:gs>
+                    </a:gsLst>
+                    <a:lin ang="5400000" scaled="0"/>
+                  </a:gradFill>
+                </a:rPr>
+              </a:br>
+              <a:r>
+                <a:rPr lang="en-US" sz="1568" kern="0" dirty="0">
+                  <a:gradFill>
+                    <a:gsLst>
+                      <a:gs pos="2917">
+                        <a:schemeClr val="tx1"/>
+                      </a:gs>
+                      <a:gs pos="30000">
+                        <a:schemeClr val="tx1"/>
+                      </a:gs>
+                    </a:gsLst>
+                    <a:lin ang="5400000" scaled="0"/>
+                  </a:gradFill>
+                </a:rPr>
+                <a:t>TypeScript</a:t>
+              </a:r>
+              <a:br>
+                <a:rPr lang="en-US" sz="1568" kern="0" dirty="0">
+                  <a:gradFill>
+                    <a:gsLst>
+                      <a:gs pos="2917">
+                        <a:schemeClr val="tx1"/>
+                      </a:gs>
+                      <a:gs pos="30000">
+                        <a:schemeClr val="tx1"/>
+                      </a:gs>
+                    </a:gsLst>
+                    <a:lin ang="5400000" scaled="0"/>
+                  </a:gradFill>
+                </a:rPr>
+              </a:br>
+              <a:br>
+                <a:rPr lang="en-US" sz="1568" kern="0" dirty="0">
+                  <a:gradFill>
+                    <a:gsLst>
+                      <a:gs pos="2917">
+                        <a:schemeClr val="tx1"/>
+                      </a:gs>
+                      <a:gs pos="30000">
+                        <a:schemeClr val="tx1"/>
+                      </a:gs>
+                    </a:gsLst>
+                    <a:lin ang="5400000" scaled="0"/>
+                  </a:gradFill>
+                </a:rPr>
+              </a:br>
+              <a:endParaRPr lang="en-US" sz="1568" kern="0" dirty="0">
+                <a:gradFill>
+                  <a:gsLst>
+                    <a:gs pos="2917">
+                      <a:schemeClr val="tx1"/>
+                    </a:gs>
+                    <a:gs pos="30000">
+                      <a:schemeClr val="tx1"/>
+                    </a:gs>
+                  </a:gsLst>
+                  <a:lin ang="5400000" scaled="0"/>
+                </a:gradFill>
+              </a:endParaRPr>
+            </a:p>
+          </p:txBody>
+        </p:sp>
+        <p:sp>
+          <p:nvSpPr>
+            <p:cNvPr id="13" name="Rectangle 12"/>
+            <p:cNvSpPr/>
+            <p:nvPr/>
+          </p:nvSpPr>
+          <p:spPr bwMode="auto">
+            <a:xfrm>
+              <a:off x="410812" y="2049518"/>
+              <a:ext cx="3857972" cy="575828"/>
+            </a:xfrm>
+            <a:prstGeom prst="rect">
+              <a:avLst/>
+            </a:prstGeom>
+            <a:solidFill>
+              <a:srgbClr val="0078D7"/>
+            </a:solidFill>
+            <a:ln>
+              <a:noFill/>
+              <a:headEnd type="none" w="med" len="med"/>
+              <a:tailEnd type="none" w="med" len="med"/>
+            </a:ln>
+          </p:spPr>
+          <p:style>
+            <a:lnRef idx="2">
+              <a:schemeClr val="accent1">
+                <a:shade val="50000"/>
+              </a:schemeClr>
+            </a:lnRef>
+            <a:fillRef idx="1">
+              <a:schemeClr val="accent1"/>
+            </a:fillRef>
+            <a:effectRef idx="0">
+              <a:schemeClr val="accent1"/>
+            </a:effectRef>
+            <a:fontRef idx="minor">
+              <a:schemeClr val="lt1"/>
+            </a:fontRef>
+          </p:style>
+          <p:txBody>
+            <a:bodyPr vert="horz" wrap="square" lIns="448212" tIns="0" rIns="0" bIns="0" numCol="1" rtlCol="0" anchor="ctr" anchorCtr="0" compatLnSpc="1">
+              <a:prstTxWarp prst="textNoShape">
+                <a:avLst/>
+              </a:prstTxWarp>
+            </a:bodyPr>
+            <a:lstStyle/>
+            <a:p>
+              <a:pPr defTabSz="914102" fontAlgn="base">
+                <a:spcBef>
+                  <a:spcPct val="0"/>
+                </a:spcBef>
+                <a:spcAft>
+                  <a:spcPct val="0"/>
+                </a:spcAft>
+                <a:defRPr/>
+              </a:pPr>
+              <a:r>
+                <a:rPr lang="en-US" sz="1961" kern="0" dirty="0">
+                  <a:gradFill>
+                    <a:gsLst>
+                      <a:gs pos="5439">
+                        <a:srgbClr val="F8F8F8"/>
+                      </a:gs>
+                      <a:gs pos="10000">
+                        <a:srgbClr val="F8F8F8"/>
+                      </a:gs>
+                    </a:gsLst>
+                    <a:lin ang="5400000" scaled="0"/>
+                  </a:gradFill>
+                </a:rPr>
+                <a:t>  Build Process &amp; Tooling</a:t>
+              </a:r>
+            </a:p>
+          </p:txBody>
+        </p:sp>
+        <p:pic>
+          <p:nvPicPr>
+            <p:cNvPr id="14" name="Picture 13"/>
+            <p:cNvPicPr>
+              <a:picLocks noChangeAspect="1"/>
+            </p:cNvPicPr>
+            <p:nvPr/>
+          </p:nvPicPr>
+          <p:blipFill>
+            <a:blip r:embed="rId6"/>
+            <a:stretch>
+              <a:fillRect/>
+            </a:stretch>
+          </p:blipFill>
+          <p:spPr>
+            <a:xfrm>
+              <a:off x="525111" y="2130149"/>
+              <a:ext cx="356616" cy="414566"/>
+            </a:xfrm>
+            <a:prstGeom prst="rect">
+              <a:avLst/>
+            </a:prstGeom>
+          </p:spPr>
+        </p:pic>
+        <p:pic>
+          <p:nvPicPr>
+            <p:cNvPr id="21" name="Picture 20"/>
+            <p:cNvPicPr>
+              <a:picLocks noChangeAspect="1"/>
+            </p:cNvPicPr>
+            <p:nvPr/>
+          </p:nvPicPr>
+          <p:blipFill>
+            <a:blip r:embed="rId7"/>
+            <a:stretch>
+              <a:fillRect/>
+            </a:stretch>
+          </p:blipFill>
+          <p:spPr>
+            <a:xfrm>
+              <a:off x="2035490" y="4734611"/>
+              <a:ext cx="419306" cy="942313"/>
+            </a:xfrm>
+            <a:prstGeom prst="rect">
+              <a:avLst/>
+            </a:prstGeom>
+          </p:spPr>
+        </p:pic>
+        <p:pic>
+          <p:nvPicPr>
+            <p:cNvPr id="25" name="Picture 24"/>
+            <p:cNvPicPr>
+              <a:picLocks noChangeAspect="1"/>
+            </p:cNvPicPr>
+            <p:nvPr/>
+          </p:nvPicPr>
+          <p:blipFill>
+            <a:blip r:embed="rId8"/>
+            <a:stretch>
+              <a:fillRect/>
+            </a:stretch>
+          </p:blipFill>
+          <p:spPr>
+            <a:xfrm>
+              <a:off x="288993" y="4980797"/>
+              <a:ext cx="1547650" cy="570187"/>
+            </a:xfrm>
+            <a:prstGeom prst="rect">
+              <a:avLst/>
+            </a:prstGeom>
+          </p:spPr>
+        </p:pic>
+        <p:pic>
+          <p:nvPicPr>
+            <p:cNvPr id="33" name="Picture 4" descr="https://upload.wikimedia.org/wikipedia/commons/thumb/d/db/Npm-logo.svg/320px-Npm-logo.svg.png"/>
+            <p:cNvPicPr>
+              <a:picLocks noChangeAspect="1" noChangeArrowheads="1"/>
+            </p:cNvPicPr>
+            <p:nvPr/>
+          </p:nvPicPr>
+          <p:blipFill>
+            <a:blip r:embed="rId9">
+              <a:extLst>
+                <a:ext uri="{28A0092B-C50C-407E-A947-70E740481C1C}">
+                  <a14:useLocalDpi xmlns:a14="http://schemas.microsoft.com/office/drawing/2010/main" val="0"/>
+                </a:ext>
+              </a:extLst>
+            </a:blip>
+            <a:srcRect/>
+            <a:stretch>
+              <a:fillRect/>
+            </a:stretch>
+          </p:blipFill>
+          <p:spPr bwMode="auto">
+            <a:xfrm>
+              <a:off x="2653643" y="4980797"/>
+              <a:ext cx="1161136" cy="449941"/>
+            </a:xfrm>
+            <a:prstGeom prst="rect">
+              <a:avLst/>
+            </a:prstGeom>
+            <a:noFill/>
+            <a:extLst>
+              <a:ext uri="{909E8E84-426E-40DD-AFC4-6F175D3DCCD1}">
+                <a14:hiddenFill xmlns:a14="http://schemas.microsoft.com/office/drawing/2010/main">
+                  <a:solidFill>
+                    <a:srgbClr val="FFFFFF"/>
+                  </a:solidFill>
+                </a14:hiddenFill>
+              </a:ext>
+            </a:extLst>
+          </p:spPr>
+        </p:pic>
+      </p:grpSp>
       <p:sp>
         <p:nvSpPr>
           <p:cNvPr id="2" name="Title 1"/>
@@ -9723,67 +10020,180 @@
           <a:p>
             <a:r>
               <a:rPr lang="en-US" dirty="0"/>
-              <a:t>REACT Components</a:t>
-            </a:r>
-          </a:p>
-        </p:txBody>
-      </p:sp>
-      <p:sp>
-        <p:nvSpPr>
-          <p:cNvPr id="3" name="Content Placeholder 2"/>
-          <p:cNvSpPr>
-            <a:spLocks noGrp="1"/>
-          </p:cNvSpPr>
-          <p:nvPr>
-            <p:ph idx="1"/>
-          </p:nvPr>
-        </p:nvSpPr>
-        <p:spPr/>
-        <p:txBody>
-          <a:bodyPr/>
-          <a:lstStyle/>
-          <a:p>
-            <a:r>
-              <a:rPr lang="en-US" dirty="0"/>
-              <a:t>Small, reusable widgets of your application </a:t>
-            </a:r>
-          </a:p>
-          <a:p>
-            <a:r>
-              <a:rPr lang="en-US" dirty="0"/>
-              <a:t>UI layout and the UI logic are tightly coupled </a:t>
-            </a:r>
-          </a:p>
-          <a:p>
-            <a:r>
-              <a:rPr lang="en-US" dirty="0"/>
-              <a:t>Can be individual or have a parent/child relationship </a:t>
-            </a:r>
-          </a:p>
-          <a:p>
-            <a:r>
-              <a:rPr lang="en-US" dirty="0"/>
-              <a:t>Use state for storing data within the component </a:t>
-            </a:r>
-          </a:p>
-          <a:p>
-            <a:r>
-              <a:rPr lang="en-US" dirty="0"/>
-              <a:t>Use props to pass data and events to a child component</a:t>
-            </a:r>
-          </a:p>
-        </p:txBody>
-      </p:sp>
+              <a:t>tooling</a:t>
+            </a:r>
+          </a:p>
+        </p:txBody>
+      </p:sp>
+      <p:cxnSp>
+        <p:nvCxnSpPr>
+          <p:cNvPr id="30" name="Straight Connector 29"/>
+          <p:cNvCxnSpPr/>
+          <p:nvPr/>
+        </p:nvCxnSpPr>
+        <p:spPr>
+          <a:xfrm>
+            <a:off x="4362126" y="1506649"/>
+            <a:ext cx="0" cy="4482124"/>
+          </a:xfrm>
+          <a:prstGeom prst="line">
+            <a:avLst/>
+          </a:prstGeom>
+          <a:ln>
+            <a:prstDash val="dash"/>
+            <a:headEnd type="none"/>
+            <a:tailEnd type="none"/>
+          </a:ln>
+        </p:spPr>
+        <p:style>
+          <a:lnRef idx="1">
+            <a:schemeClr val="accent2"/>
+          </a:lnRef>
+          <a:fillRef idx="0">
+            <a:schemeClr val="accent2"/>
+          </a:fillRef>
+          <a:effectRef idx="0">
+            <a:schemeClr val="accent2"/>
+          </a:effectRef>
+          <a:fontRef idx="minor">
+            <a:schemeClr val="tx1"/>
+          </a:fontRef>
+        </p:style>
+      </p:cxnSp>
     </p:spTree>
     <p:extLst>
       <p:ext uri="{BB962C8B-B14F-4D97-AF65-F5344CB8AC3E}">
-        <p14:creationId xmlns:p14="http://schemas.microsoft.com/office/powerpoint/2010/main" val="1808754801"/>
+        <p14:creationId xmlns:p14="http://schemas.microsoft.com/office/powerpoint/2010/main" val="156578051"/>
       </p:ext>
     </p:extLst>
   </p:cSld>
   <p:clrMapOvr>
     <a:masterClrMapping/>
   </p:clrMapOvr>
+  <mc:AlternateContent xmlns:mc="http://schemas.openxmlformats.org/markup-compatibility/2006" xmlns:p14="http://schemas.microsoft.com/office/powerpoint/2010/main">
+    <mc:Choice Requires="p14">
+      <p:transition spd="med" p14:dur="700">
+        <p:fade/>
+      </p:transition>
+    </mc:Choice>
+    <mc:Fallback xmlns="">
+      <p:transition spd="med">
+        <p:fade/>
+      </p:transition>
+    </mc:Fallback>
+  </mc:AlternateContent>
+  <p:timing>
+    <p:tnLst>
+      <p:par>
+        <p:cTn id="1" dur="indefinite" restart="never" nodeType="tmRoot">
+          <p:childTnLst>
+            <p:seq concurrent="1" nextAc="seek">
+              <p:cTn id="2" dur="indefinite" nodeType="mainSeq">
+                <p:childTnLst>
+                  <p:par>
+                    <p:cTn id="3" fill="hold">
+                      <p:stCondLst>
+                        <p:cond delay="indefinite"/>
+                        <p:cond evt="onBegin" delay="0">
+                          <p:tn val="2"/>
+                        </p:cond>
+                      </p:stCondLst>
+                      <p:childTnLst>
+                        <p:par>
+                          <p:cTn id="4" fill="hold">
+                            <p:stCondLst>
+                              <p:cond delay="0"/>
+                            </p:stCondLst>
+                            <p:childTnLst>
+                              <p:par>
+                                <p:cTn id="5" presetID="10" presetClass="entr" presetSubtype="0" fill="hold" grpId="0" nodeType="withEffect">
+                                  <p:stCondLst>
+                                    <p:cond delay="0"/>
+                                  </p:stCondLst>
+                                  <p:childTnLst>
+                                    <p:set>
+                                      <p:cBhvr>
+                                        <p:cTn id="6" dur="1" fill="hold">
+                                          <p:stCondLst>
+                                            <p:cond delay="0"/>
+                                          </p:stCondLst>
+                                        </p:cTn>
+                                        <p:tgtEl>
+                                          <p:spTgt spid="2"/>
+                                        </p:tgtEl>
+                                        <p:attrNameLst>
+                                          <p:attrName>style.visibility</p:attrName>
+                                        </p:attrNameLst>
+                                      </p:cBhvr>
+                                      <p:to>
+                                        <p:strVal val="visible"/>
+                                      </p:to>
+                                    </p:set>
+                                    <p:animEffect transition="in" filter="fade">
+                                      <p:cBhvr>
+                                        <p:cTn id="7" dur="500"/>
+                                        <p:tgtEl>
+                                          <p:spTgt spid="2"/>
+                                        </p:tgtEl>
+                                      </p:cBhvr>
+                                    </p:animEffect>
+                                  </p:childTnLst>
+                                </p:cTn>
+                              </p:par>
+                              <p:par>
+                                <p:cTn id="8" presetID="42" presetClass="path" presetSubtype="0" decel="100000" fill="hold" grpId="1" nodeType="withEffect">
+                                  <p:stCondLst>
+                                    <p:cond delay="0"/>
+                                  </p:stCondLst>
+                                  <p:childTnLst>
+                                    <p:animMotion origin="layout" path="M -6.38244E-7 -0.07784 L -6.38244E-7 4.70268E-6 " pathEditMode="relative" rAng="0" ptsTypes="AA">
+                                      <p:cBhvr>
+                                        <p:cTn id="9" dur="500" fill="hold"/>
+                                        <p:tgtEl>
+                                          <p:spTgt spid="2"/>
+                                        </p:tgtEl>
+                                        <p:attrNameLst>
+                                          <p:attrName>ppt_x</p:attrName>
+                                          <p:attrName>ppt_y</p:attrName>
+                                        </p:attrNameLst>
+                                      </p:cBhvr>
+                                      <p:rCtr x="0" y="3813"/>
+                                    </p:animMotion>
+                                  </p:childTnLst>
+                                </p:cTn>
+                              </p:par>
+                            </p:childTnLst>
+                          </p:cTn>
+                        </p:par>
+                      </p:childTnLst>
+                    </p:cTn>
+                  </p:par>
+                </p:childTnLst>
+              </p:cTn>
+              <p:prevCondLst>
+                <p:cond evt="onPrev" delay="0">
+                  <p:tgtEl>
+                    <p:sldTgt/>
+                  </p:tgtEl>
+                </p:cond>
+              </p:prevCondLst>
+              <p:nextCondLst>
+                <p:cond evt="onNext" delay="0">
+                  <p:tgtEl>
+                    <p:sldTgt/>
+                  </p:tgtEl>
+                </p:cond>
+              </p:nextCondLst>
+            </p:seq>
+          </p:childTnLst>
+        </p:cTn>
+      </p:par>
+    </p:tnLst>
+    <p:bldLst>
+      <p:bldP spid="2" grpId="0"/>
+      <p:bldP spid="2" grpId="1"/>
+    </p:bldLst>
+  </p:timing>
 </p:sld>
 </file>
 
@@ -9820,8 +10230,12 @@
           <a:lstStyle/>
           <a:p>
             <a:r>
-              <a:rPr lang="en-US" dirty="0"/>
-              <a:t>React Basics</a:t>
+              <a:rPr lang="en-US" dirty="0" err="1"/>
+              <a:t>REACt</a:t>
+            </a:r>
+            <a:r>
+              <a:rPr lang="en-US" dirty="0"/>
+              <a:t> key Components</a:t>
             </a:r>
           </a:p>
         </p:txBody>
@@ -9841,34 +10255,142 @@
           <a:bodyPr/>
           <a:lstStyle/>
           <a:p>
-            <a:r>
-              <a:rPr lang="en-US" dirty="0"/>
-              <a:t>Need to reference the React libraries</a:t>
-            </a:r>
-          </a:p>
-          <a:p>
-            <a:pPr lvl="1"/>
-            <a:r>
-              <a:rPr lang="en-US" dirty="0"/>
-              <a:t>React</a:t>
-            </a:r>
-          </a:p>
-          <a:p>
-            <a:pPr lvl="1"/>
-            <a:r>
-              <a:rPr lang="en-US" dirty="0"/>
-              <a:t>React-</a:t>
-            </a:r>
-            <a:r>
-              <a:rPr lang="en-US" dirty="0" err="1"/>
-              <a:t>dom</a:t>
-            </a:r>
             <a:endParaRPr lang="en-US" dirty="0"/>
           </a:p>
-          <a:p>
-            <a:r>
-              <a:rPr lang="en-US" dirty="0"/>
-              <a:t>Your markup is returned from the render method</a:t>
+        </p:txBody>
+      </p:sp>
+      <p:sp>
+        <p:nvSpPr>
+          <p:cNvPr id="5" name="Rectangle: Rounded Corners 4"/>
+          <p:cNvSpPr/>
+          <p:nvPr/>
+        </p:nvSpPr>
+        <p:spPr>
+          <a:xfrm>
+            <a:off x="789039" y="3075039"/>
+            <a:ext cx="3318387" cy="1460090"/>
+          </a:xfrm>
+          <a:prstGeom prst="roundRect">
+            <a:avLst/>
+          </a:prstGeom>
+        </p:spPr>
+        <p:style>
+          <a:lnRef idx="2">
+            <a:schemeClr val="accent1">
+              <a:shade val="50000"/>
+            </a:schemeClr>
+          </a:lnRef>
+          <a:fillRef idx="1">
+            <a:schemeClr val="accent1"/>
+          </a:fillRef>
+          <a:effectRef idx="0">
+            <a:schemeClr val="accent1"/>
+          </a:effectRef>
+          <a:fontRef idx="minor">
+            <a:schemeClr val="lt1"/>
+          </a:fontRef>
+        </p:style>
+        <p:txBody>
+          <a:bodyPr rtlCol="0" anchor="ctr"/>
+          <a:lstStyle/>
+          <a:p>
+            <a:pPr algn="ctr"/>
+            <a:r>
+              <a:rPr lang="en-US" sz="3600" dirty="0"/>
+              <a:t>Build Components</a:t>
+            </a:r>
+          </a:p>
+        </p:txBody>
+      </p:sp>
+      <p:sp>
+        <p:nvSpPr>
+          <p:cNvPr id="6" name="Rectangle: Rounded Corners 5"/>
+          <p:cNvSpPr/>
+          <p:nvPr/>
+        </p:nvSpPr>
+        <p:spPr>
+          <a:xfrm>
+            <a:off x="4318819" y="3075039"/>
+            <a:ext cx="3318387" cy="1460090"/>
+          </a:xfrm>
+          <a:prstGeom prst="roundRect">
+            <a:avLst/>
+          </a:prstGeom>
+        </p:spPr>
+        <p:style>
+          <a:lnRef idx="2">
+            <a:schemeClr val="accent1">
+              <a:shade val="50000"/>
+            </a:schemeClr>
+          </a:lnRef>
+          <a:fillRef idx="1">
+            <a:schemeClr val="accent1"/>
+          </a:fillRef>
+          <a:effectRef idx="0">
+            <a:schemeClr val="accent1"/>
+          </a:effectRef>
+          <a:fontRef idx="minor">
+            <a:schemeClr val="lt1"/>
+          </a:fontRef>
+        </p:style>
+        <p:txBody>
+          <a:bodyPr rtlCol="0" anchor="ctr"/>
+          <a:lstStyle/>
+          <a:p>
+            <a:pPr algn="ctr"/>
+            <a:r>
+              <a:rPr lang="en-US" sz="3600" dirty="0"/>
+              <a:t>Re-Render, Don’t Mutate</a:t>
+            </a:r>
+          </a:p>
+        </p:txBody>
+      </p:sp>
+      <p:sp>
+        <p:nvSpPr>
+          <p:cNvPr id="7" name="Rectangle: Rounded Corners 6"/>
+          <p:cNvSpPr/>
+          <p:nvPr/>
+        </p:nvSpPr>
+        <p:spPr>
+          <a:xfrm>
+            <a:off x="7848599" y="3075039"/>
+            <a:ext cx="3318387" cy="1460090"/>
+          </a:xfrm>
+          <a:prstGeom prst="roundRect">
+            <a:avLst/>
+          </a:prstGeom>
+        </p:spPr>
+        <p:style>
+          <a:lnRef idx="2">
+            <a:schemeClr val="accent1">
+              <a:shade val="50000"/>
+            </a:schemeClr>
+          </a:lnRef>
+          <a:fillRef idx="1">
+            <a:schemeClr val="accent1"/>
+          </a:fillRef>
+          <a:effectRef idx="0">
+            <a:schemeClr val="accent1"/>
+          </a:effectRef>
+          <a:fontRef idx="minor">
+            <a:schemeClr val="lt1"/>
+          </a:fontRef>
+        </p:style>
+        <p:txBody>
+          <a:bodyPr rtlCol="0" anchor="ctr"/>
+          <a:lstStyle/>
+          <a:p>
+            <a:pPr algn="ctr"/>
+            <a:r>
+              <a:rPr lang="en-US" sz="3600" dirty="0"/>
+              <a:t>Fast Virtual</a:t>
+            </a:r>
+          </a:p>
+          <a:p>
+            <a:pPr algn="ctr"/>
+            <a:r>
+              <a:rPr lang="en-US" sz="3600" dirty="0"/>
+              <a:t>DOM</a:t>
             </a:r>
           </a:p>
         </p:txBody>
@@ -9876,7 +10398,7 @@
     </p:spTree>
     <p:extLst>
       <p:ext uri="{BB962C8B-B14F-4D97-AF65-F5344CB8AC3E}">
-        <p14:creationId xmlns:p14="http://schemas.microsoft.com/office/powerpoint/2010/main" val="75344693"/>
+        <p14:creationId xmlns:p14="http://schemas.microsoft.com/office/powerpoint/2010/main" val="274571820"/>
       </p:ext>
     </p:extLst>
   </p:cSld>
@@ -9920,7 +10442,7 @@
           <a:p>
             <a:r>
               <a:rPr lang="en-US" dirty="0"/>
-              <a:t>Markup in React</a:t>
+              <a:t>REACT Components</a:t>
             </a:r>
           </a:p>
         </p:txBody>
@@ -9942,32 +10464,31 @@
           <a:p>
             <a:r>
               <a:rPr lang="en-US" dirty="0"/>
-              <a:t>Added as part of your </a:t>
-            </a:r>
-            <a:r>
-              <a:rPr lang="en-US" dirty="0" err="1"/>
-              <a:t>jsx</a:t>
-            </a:r>
-            <a:r>
-              <a:rPr lang="en-US" dirty="0"/>
-              <a:t> or </a:t>
-            </a:r>
-            <a:r>
-              <a:rPr lang="en-US" dirty="0" err="1"/>
-              <a:t>tsx</a:t>
-            </a:r>
-            <a:endParaRPr lang="en-US" dirty="0"/>
-          </a:p>
-          <a:p>
-            <a:r>
-              <a:rPr lang="en-US" dirty="0"/>
-              <a:t>Per XHTML standard, React assumes lowercase tags are default html</a:t>
-            </a:r>
-          </a:p>
-          <a:p>
-            <a:r>
-              <a:rPr lang="en-US" dirty="0"/>
-              <a:t>Your components are added as mixed case tags</a:t>
+              <a:t>Small, reusable widgets of your application </a:t>
+            </a:r>
+          </a:p>
+          <a:p>
+            <a:r>
+              <a:rPr lang="en-US" dirty="0"/>
+              <a:t>UI layout and the UI logic are tightly coupled </a:t>
+            </a:r>
+          </a:p>
+          <a:p>
+            <a:r>
+              <a:rPr lang="en-US" dirty="0"/>
+              <a:t>Can be individual or have a parent/child relationship </a:t>
+            </a:r>
+          </a:p>
+          <a:p>
+            <a:r>
+              <a:rPr lang="en-US" dirty="0"/>
+              <a:t>Use state for storing data within the component </a:t>
+            </a:r>
+          </a:p>
+          <a:p>
+            <a:r>
+              <a:rPr lang="en-US" dirty="0"/>
+              <a:t>Use props to pass data and events to a child component</a:t>
             </a:r>
           </a:p>
         </p:txBody>
@@ -9975,7 +10496,7 @@
     </p:spTree>
     <p:extLst>
       <p:ext uri="{BB962C8B-B14F-4D97-AF65-F5344CB8AC3E}">
-        <p14:creationId xmlns:p14="http://schemas.microsoft.com/office/powerpoint/2010/main" val="3289303343"/>
+        <p14:creationId xmlns:p14="http://schemas.microsoft.com/office/powerpoint/2010/main" val="1808754801"/>
       </p:ext>
     </p:extLst>
   </p:cSld>
@@ -10019,7 +10540,7 @@
           <a:p>
             <a:r>
               <a:rPr lang="en-US" dirty="0"/>
-              <a:t>Props and State</a:t>
+              <a:t>React Basics</a:t>
             </a:r>
           </a:p>
         </p:txBody>
@@ -10041,60 +10562,32 @@
           <a:p>
             <a:r>
               <a:rPr lang="en-US" dirty="0"/>
-              <a:t>Props</a:t>
+              <a:t>Need to reference the React libraries</a:t>
             </a:r>
           </a:p>
           <a:p>
             <a:pPr lvl="1"/>
             <a:r>
               <a:rPr lang="en-US" dirty="0"/>
-              <a:t>Using props to pass data to your components</a:t>
+              <a:t>React</a:t>
             </a:r>
           </a:p>
           <a:p>
             <a:pPr lvl="1"/>
             <a:r>
               <a:rPr lang="en-US" dirty="0"/>
-              <a:t>Props are read-only</a:t>
-            </a:r>
-          </a:p>
-          <a:p>
-            <a:r>
-              <a:rPr lang="en-US" dirty="0"/>
-              <a:t>State</a:t>
-            </a:r>
-          </a:p>
-          <a:p>
-            <a:pPr lvl="1"/>
-            <a:r>
-              <a:rPr lang="en-US" dirty="0"/>
-              <a:t>State allows us to receive/work with changeable data</a:t>
-            </a:r>
-          </a:p>
-          <a:p>
-            <a:pPr lvl="1"/>
-            <a:r>
-              <a:rPr lang="en-US" dirty="0"/>
-              <a:t>Set initial state in constructor</a:t>
-            </a:r>
-          </a:p>
-          <a:p>
-            <a:pPr lvl="1"/>
-            <a:r>
-              <a:rPr lang="en-US" dirty="0"/>
-              <a:t>Do not update directly use </a:t>
+              <a:t>React-</a:t>
             </a:r>
             <a:r>
               <a:rPr lang="en-US" dirty="0" err="1"/>
-              <a:t>setState</a:t>
+              <a:t>dom</a:t>
             </a:r>
             <a:endParaRPr lang="en-US" dirty="0"/>
           </a:p>
           <a:p>
-            <a:pPr lvl="1"/>
-            <a:r>
-              <a:rPr lang="en-US" dirty="0"/>
-              <a:t>Updates are merged</a:t>
+            <a:r>
+              <a:rPr lang="en-US" dirty="0"/>
+              <a:t>Your markup is returned from the render method</a:t>
             </a:r>
           </a:p>
         </p:txBody>
@@ -10102,7 +10595,7 @@
     </p:spTree>
     <p:extLst>
       <p:ext uri="{BB962C8B-B14F-4D97-AF65-F5344CB8AC3E}">
-        <p14:creationId xmlns:p14="http://schemas.microsoft.com/office/powerpoint/2010/main" val="4232452455"/>
+        <p14:creationId xmlns:p14="http://schemas.microsoft.com/office/powerpoint/2010/main" val="75344693"/>
       </p:ext>
     </p:extLst>
   </p:cSld>
@@ -10146,7 +10639,7 @@
           <a:p>
             <a:r>
               <a:rPr lang="en-US" dirty="0"/>
-              <a:t>Lifecycle</a:t>
+              <a:t>Markup in React</a:t>
             </a:r>
           </a:p>
         </p:txBody>
@@ -10168,66 +10661,40 @@
           <a:p>
             <a:r>
               <a:rPr lang="en-US" dirty="0"/>
-              <a:t>constructor()</a:t>
-            </a:r>
-          </a:p>
-          <a:p>
-            <a:pPr lvl="1"/>
-            <a:r>
-              <a:rPr lang="en-US" dirty="0"/>
-              <a:t>Used to set initial state</a:t>
-            </a:r>
-          </a:p>
-          <a:p>
-            <a:pPr lvl="1"/>
-            <a:r>
-              <a:rPr lang="en-US" dirty="0"/>
-              <a:t>Best Practice don’t load external data here</a:t>
-            </a:r>
-          </a:p>
-          <a:p>
+              <a:t>Added as part of your </a:t>
+            </a:r>
             <a:r>
               <a:rPr lang="en-US" dirty="0" err="1"/>
-              <a:t>componentDidMount</a:t>
-            </a:r>
-            <a:r>
-              <a:rPr lang="en-US" dirty="0"/>
-              <a:t>()</a:t>
-            </a:r>
-          </a:p>
-          <a:p>
-            <a:pPr lvl="1"/>
-            <a:r>
-              <a:rPr lang="en-US" dirty="0"/>
-              <a:t>Used to setup component and load external data</a:t>
-            </a:r>
-          </a:p>
-          <a:p>
+              <a:t>jsx</a:t>
+            </a:r>
+            <a:r>
+              <a:rPr lang="en-US" dirty="0"/>
+              <a:t> or </a:t>
+            </a:r>
             <a:r>
               <a:rPr lang="en-US" dirty="0" err="1"/>
-              <a:t>compononentWillUnmount</a:t>
-            </a:r>
-            <a:r>
-              <a:rPr lang="en-US" dirty="0"/>
-              <a:t>()</a:t>
-            </a:r>
-          </a:p>
-          <a:p>
-            <a:pPr lvl="1"/>
-            <a:r>
-              <a:rPr lang="en-US" dirty="0"/>
-              <a:t>Used for clean up</a:t>
-            </a:r>
-          </a:p>
-          <a:p>
+              <a:t>tsx</a:t>
+            </a:r>
             <a:endParaRPr lang="en-US" dirty="0"/>
+          </a:p>
+          <a:p>
+            <a:r>
+              <a:rPr lang="en-US" dirty="0"/>
+              <a:t>Per XHTML standard, React assumes lowercase tags are default html</a:t>
+            </a:r>
+          </a:p>
+          <a:p>
+            <a:r>
+              <a:rPr lang="en-US" dirty="0"/>
+              <a:t>Your components are added as mixed case tags</a:t>
+            </a:r>
           </a:p>
         </p:txBody>
       </p:sp>
     </p:spTree>
     <p:extLst>
       <p:ext uri="{BB962C8B-B14F-4D97-AF65-F5344CB8AC3E}">
-        <p14:creationId xmlns:p14="http://schemas.microsoft.com/office/powerpoint/2010/main" val="1626070486"/>
+        <p14:creationId xmlns:p14="http://schemas.microsoft.com/office/powerpoint/2010/main" val="3289303343"/>
       </p:ext>
     </p:extLst>
   </p:cSld>

</xml_diff>